<commit_message>
MàJ avant partage des URLs sur Github et Databricks
</commit_message>
<xml_diff>
--- a/02_EDA/99_Project_Speed_Dating/01_speed_dating_project.pptx
+++ b/02_EDA/99_Project_Speed_Dating/01_speed_dating_project.pptx
@@ -196,12 +196,12 @@
   <pc:docChgLst>
     <pc:chgData name="Philippe Baucour" userId="5102170ae7533958" providerId="LiveId" clId="{B2EE689F-2065-402A-8908-926DEA39FEF1}"/>
     <pc:docChg chg="undo custSel addSld delSld modSld sldOrd">
-      <pc:chgData name="Philippe Baucour" userId="5102170ae7533958" providerId="LiveId" clId="{B2EE689F-2065-402A-8908-926DEA39FEF1}" dt="2024-08-24T09:43:51.066" v="2651" actId="20577"/>
+      <pc:chgData name="Philippe Baucour" userId="5102170ae7533958" providerId="LiveId" clId="{B2EE689F-2065-402A-8908-926DEA39FEF1}" dt="2024-08-26T09:51:38.387" v="2730" actId="20577"/>
       <pc:docMkLst>
         <pc:docMk/>
       </pc:docMkLst>
-      <pc:sldChg chg="modSp mod">
-        <pc:chgData name="Philippe Baucour" userId="5102170ae7533958" providerId="LiveId" clId="{B2EE689F-2065-402A-8908-926DEA39FEF1}" dt="2024-08-24T09:43:51.066" v="2651" actId="20577"/>
+      <pc:sldChg chg="modSp mod modNotesTx">
+        <pc:chgData name="Philippe Baucour" userId="5102170ae7533958" providerId="LiveId" clId="{B2EE689F-2065-402A-8908-926DEA39FEF1}" dt="2024-08-26T08:44:29.815" v="2702" actId="12"/>
         <pc:sldMkLst>
           <pc:docMk/>
           <pc:sldMk cId="1392602265" sldId="256"/>
@@ -268,7 +268,7 @@
         </pc:sldMkLst>
       </pc:sldChg>
       <pc:sldChg chg="addSp delSp modSp new mod ord modClrScheme chgLayout modNotesTx">
-        <pc:chgData name="Philippe Baucour" userId="5102170ae7533958" providerId="LiveId" clId="{B2EE689F-2065-402A-8908-926DEA39FEF1}" dt="2024-08-20T16:41:28.836" v="2358" actId="20577"/>
+        <pc:chgData name="Philippe Baucour" userId="5102170ae7533958" providerId="LiveId" clId="{B2EE689F-2065-402A-8908-926DEA39FEF1}" dt="2024-08-26T09:51:38.387" v="2730" actId="20577"/>
         <pc:sldMkLst>
           <pc:docMk/>
           <pc:sldMk cId="3595025937" sldId="259"/>
@@ -282,7 +282,7 @@
           </ac:spMkLst>
         </pc:spChg>
         <pc:spChg chg="add mod">
-          <ac:chgData name="Philippe Baucour" userId="5102170ae7533958" providerId="LiveId" clId="{B2EE689F-2065-402A-8908-926DEA39FEF1}" dt="2024-08-20T14:12:08.730" v="141" actId="1035"/>
+          <ac:chgData name="Philippe Baucour" userId="5102170ae7533958" providerId="LiveId" clId="{B2EE689F-2065-402A-8908-926DEA39FEF1}" dt="2024-08-26T09:51:38.387" v="2730" actId="20577"/>
           <ac:spMkLst>
             <pc:docMk/>
             <pc:sldMk cId="3595025937" sldId="259"/>
@@ -298,7 +298,7 @@
           </ac:spMkLst>
         </pc:spChg>
         <pc:picChg chg="add mod">
-          <ac:chgData name="Philippe Baucour" userId="5102170ae7533958" providerId="LiveId" clId="{B2EE689F-2065-402A-8908-926DEA39FEF1}" dt="2024-08-20T14:10:49.808" v="90" actId="1036"/>
+          <ac:chgData name="Philippe Baucour" userId="5102170ae7533958" providerId="LiveId" clId="{B2EE689F-2065-402A-8908-926DEA39FEF1}" dt="2024-08-26T09:51:04.834" v="2703" actId="688"/>
           <ac:picMkLst>
             <pc:docMk/>
             <pc:sldMk cId="3595025937" sldId="259"/>
@@ -7848,7 +7848,7 @@
           <a:p>
             <a:fld id="{FD1752CD-A7D2-4825-BC26-9DAEFBD0A5FF}" type="datetimeFigureOut">
               <a:rPr lang="fr-FR" smtClean="0"/>
-              <a:t>24/08/2024</a:t>
+              <a:t>26/08/2024</a:t>
             </a:fld>
             <a:endParaRPr lang="fr-FR"/>
           </a:p>
@@ -8160,43 +8160,276 @@
           <a:lstStyle/>
           <a:p>
             <a:r>
-              <a:rPr lang="fr-FR" dirty="0"/>
-              <a:t>Un match tous les 6 </a:t>
-            </a:r>
-            <a:r>
-              <a:rPr lang="fr-FR" dirty="0" err="1"/>
-              <a:t>RdV</a:t>
-            </a:r>
-            <a:r>
-              <a:rPr lang="fr-FR" dirty="0"/>
-              <a:t> 16,5 %</a:t>
-            </a:r>
-          </a:p>
-          <a:p>
-            <a:r>
-              <a:rPr lang="fr-FR" dirty="0"/>
-              <a:t>On propose de finir la soirée sur le dance </a:t>
-            </a:r>
-            <a:r>
-              <a:rPr lang="fr-FR" dirty="0" err="1"/>
-              <a:t>floor</a:t>
-            </a:r>
-            <a:r>
-              <a:rPr lang="fr-FR" dirty="0"/>
-              <a:t> car </a:t>
-            </a:r>
-            <a:r>
-              <a:rPr lang="fr-FR" dirty="0" err="1"/>
-              <a:t>clubing</a:t>
-            </a:r>
-            <a:r>
-              <a:rPr lang="fr-FR" dirty="0"/>
-              <a:t> est l'activité </a:t>
-            </a:r>
-            <a:r>
-              <a:rPr lang="fr-FR"/>
-              <a:t>qui déclenche le plus de matches</a:t>
-            </a:r>
+              <a:rPr lang="fr-FR" b="1" dirty="0" err="1"/>
+              <a:t>Criteria</a:t>
+            </a:r>
+            <a:r>
+              <a:rPr lang="fr-FR" b="1" dirty="0"/>
+              <a:t> : </a:t>
+            </a:r>
+          </a:p>
+          <a:p>
+            <a:endParaRPr lang="fr-FR" b="1" dirty="0"/>
+          </a:p>
+          <a:p>
+            <a:pPr algn="l">
+              <a:buFont typeface="Arial" panose="020B0604020202020204" pitchFamily="34" charset="0"/>
+              <a:buNone/>
+            </a:pPr>
+            <a:r>
+              <a:rPr lang="en-US" b="0" i="0" dirty="0">
+                <a:solidFill>
+                  <a:srgbClr val="1F2123"/>
+                </a:solidFill>
+                <a:effectLst/>
+                <a:highlight>
+                  <a:srgbClr val="FBFDFF"/>
+                </a:highlight>
+                <a:latin typeface="Inter"/>
+              </a:rPr>
+              <a:t>The chosen dataset is able to answer the set problem:</a:t>
+            </a:r>
+          </a:p>
+          <a:p>
+            <a:pPr algn="l">
+              <a:buFont typeface="Arial" panose="020B0604020202020204" pitchFamily="34" charset="0"/>
+              <a:buNone/>
+            </a:pPr>
+            <a:endParaRPr lang="en-US" b="0" i="0" dirty="0">
+              <a:solidFill>
+                <a:srgbClr val="1F2123"/>
+              </a:solidFill>
+              <a:effectLst/>
+              <a:highlight>
+                <a:srgbClr val="FBFDFF"/>
+              </a:highlight>
+              <a:latin typeface="Inter"/>
+            </a:endParaRPr>
+          </a:p>
+          <a:p>
+            <a:pPr marL="171450" indent="-171450" algn="l">
+              <a:buFont typeface="Arial" panose="020B0604020202020204" pitchFamily="34" charset="0"/>
+              <a:buChar char="•"/>
+            </a:pPr>
+            <a:r>
+              <a:rPr lang="en-US" b="0" i="0" dirty="0">
+                <a:solidFill>
+                  <a:srgbClr val="1F2123"/>
+                </a:solidFill>
+                <a:effectLst/>
+                <a:highlight>
+                  <a:srgbClr val="FBFDFF"/>
+                </a:highlight>
+                <a:latin typeface="Inter"/>
+              </a:rPr>
+              <a:t>Relevance of the elements and the data cleaning methodology (management of missing or inconsistent values, etc.)</a:t>
+            </a:r>
+          </a:p>
+          <a:p>
+            <a:pPr marL="171450" indent="-171450" algn="l">
+              <a:buFont typeface="Arial" panose="020B0604020202020204" pitchFamily="34" charset="0"/>
+              <a:buChar char="•"/>
+            </a:pPr>
+            <a:r>
+              <a:rPr lang="en-US" b="0" i="0" dirty="0">
+                <a:solidFill>
+                  <a:srgbClr val="1F2123"/>
+                </a:solidFill>
+                <a:effectLst/>
+                <a:highlight>
+                  <a:srgbClr val="FBFDFF"/>
+                </a:highlight>
+                <a:latin typeface="Inter"/>
+              </a:rPr>
+              <a:t>Clarity of the database</a:t>
+            </a:r>
+          </a:p>
+          <a:p>
+            <a:pPr marL="171450" indent="-171450" algn="l">
+              <a:buFont typeface="Arial" panose="020B0604020202020204" pitchFamily="34" charset="0"/>
+              <a:buChar char="•"/>
+            </a:pPr>
+            <a:r>
+              <a:rPr lang="en-US" b="0" i="0" dirty="0">
+                <a:solidFill>
+                  <a:srgbClr val="1F2123"/>
+                </a:solidFill>
+                <a:effectLst/>
+                <a:highlight>
+                  <a:srgbClr val="FBFDFF"/>
+                </a:highlight>
+                <a:latin typeface="Inter"/>
+              </a:rPr>
+              <a:t>Availability of data for analysis</a:t>
+            </a:r>
+          </a:p>
+          <a:p>
+            <a:pPr marL="0" indent="0" algn="l">
+              <a:buFont typeface="Arial" panose="020B0604020202020204" pitchFamily="34" charset="0"/>
+              <a:buNone/>
+            </a:pPr>
+            <a:endParaRPr lang="en-US" b="0" i="0" dirty="0">
+              <a:solidFill>
+                <a:srgbClr val="1F2123"/>
+              </a:solidFill>
+              <a:effectLst/>
+              <a:highlight>
+                <a:srgbClr val="FBFDFF"/>
+              </a:highlight>
+              <a:latin typeface="Inter"/>
+            </a:endParaRPr>
+          </a:p>
+          <a:p>
+            <a:pPr marL="0" indent="0" algn="l">
+              <a:buFont typeface="Arial" panose="020B0604020202020204" pitchFamily="34" charset="0"/>
+              <a:buNone/>
+            </a:pPr>
+            <a:r>
+              <a:rPr lang="en-US" b="0" i="0" dirty="0">
+                <a:solidFill>
+                  <a:srgbClr val="1F2123"/>
+                </a:solidFill>
+                <a:effectLst/>
+                <a:highlight>
+                  <a:srgbClr val="FBFDFF"/>
+                </a:highlight>
+                <a:latin typeface="Inter"/>
+              </a:rPr>
+              <a:t>The analyses defined are effective in answering the set problem:</a:t>
+            </a:r>
+          </a:p>
+          <a:p>
+            <a:pPr marL="171450" indent="-171450" algn="l">
+              <a:buFont typeface="Arial" panose="020B0604020202020204" pitchFamily="34" charset="0"/>
+              <a:buChar char="•"/>
+            </a:pPr>
+            <a:r>
+              <a:rPr lang="en-US" b="0" i="0" dirty="0">
+                <a:solidFill>
+                  <a:srgbClr val="1F2123"/>
+                </a:solidFill>
+                <a:effectLst/>
+                <a:highlight>
+                  <a:srgbClr val="FBFDFF"/>
+                </a:highlight>
+                <a:latin typeface="Inter"/>
+              </a:rPr>
+              <a:t>Relevance of the choice of analyses performed (univariate analyses of means &amp; variances performed, detection of anomalies by distribution analysis performed, correlation analysis (Pearson Matrix) performed, etc.)</a:t>
+            </a:r>
+          </a:p>
+          <a:p>
+            <a:pPr marL="171450" indent="-171450" algn="l">
+              <a:buFont typeface="Arial" panose="020B0604020202020204" pitchFamily="34" charset="0"/>
+              <a:buChar char="•"/>
+            </a:pPr>
+            <a:r>
+              <a:rPr lang="en-US" b="0" i="0" dirty="0">
+                <a:solidFill>
+                  <a:srgbClr val="1F2123"/>
+                </a:solidFill>
+                <a:effectLst/>
+                <a:highlight>
+                  <a:srgbClr val="FBFDFF"/>
+                </a:highlight>
+                <a:latin typeface="Inter"/>
+              </a:rPr>
+              <a:t>Efficiency of the analyses performed</a:t>
+            </a:r>
+          </a:p>
+          <a:p>
+            <a:pPr marL="171450" indent="-171450" algn="l">
+              <a:buFont typeface="Arial" panose="020B0604020202020204" pitchFamily="34" charset="0"/>
+              <a:buChar char="•"/>
+            </a:pPr>
+            <a:r>
+              <a:rPr lang="en-US" b="0" i="0" dirty="0">
+                <a:solidFill>
+                  <a:srgbClr val="1F2123"/>
+                </a:solidFill>
+                <a:effectLst/>
+                <a:highlight>
+                  <a:srgbClr val="FBFDFF"/>
+                </a:highlight>
+                <a:latin typeface="Inter"/>
+              </a:rPr>
+              <a:t>Effectiveness of the parallelized treatment applied</a:t>
+            </a:r>
+          </a:p>
+          <a:p>
+            <a:pPr marL="171450" indent="-171450" algn="l">
+              <a:buFont typeface="Arial" panose="020B0604020202020204" pitchFamily="34" charset="0"/>
+              <a:buChar char="•"/>
+            </a:pPr>
+            <a:endParaRPr lang="en-US" b="0" i="0" dirty="0">
+              <a:solidFill>
+                <a:srgbClr val="1F2123"/>
+              </a:solidFill>
+              <a:effectLst/>
+              <a:highlight>
+                <a:srgbClr val="FBFDFF"/>
+              </a:highlight>
+              <a:latin typeface="Inter"/>
+            </a:endParaRPr>
+          </a:p>
+          <a:p>
+            <a:pPr marL="0" indent="0" algn="l">
+              <a:buFont typeface="Arial" panose="020B0604020202020204" pitchFamily="34" charset="0"/>
+              <a:buNone/>
+            </a:pPr>
+            <a:r>
+              <a:rPr lang="en-US" b="0" i="0" dirty="0">
+                <a:solidFill>
+                  <a:srgbClr val="1F2123"/>
+                </a:solidFill>
+                <a:effectLst/>
+                <a:highlight>
+                  <a:srgbClr val="FBFDFF"/>
+                </a:highlight>
+                <a:latin typeface="Inter"/>
+              </a:rPr>
+              <a:t>The recommendations that emerge from the results of these analyses are relevant:</a:t>
+            </a:r>
+          </a:p>
+          <a:p>
+            <a:pPr marL="171450" indent="-171450" algn="l">
+              <a:buFont typeface="Arial" panose="020B0604020202020204" pitchFamily="34" charset="0"/>
+              <a:buChar char="•"/>
+            </a:pPr>
+            <a:r>
+              <a:rPr lang="en-US" b="0" i="0" dirty="0">
+                <a:solidFill>
+                  <a:srgbClr val="1F2123"/>
+                </a:solidFill>
+                <a:effectLst/>
+                <a:highlight>
+                  <a:srgbClr val="FBFDFF"/>
+                </a:highlight>
+                <a:latin typeface="Inter"/>
+              </a:rPr>
+              <a:t>Clarity and simplicity of the graphs constructed and presented.</a:t>
+            </a:r>
+          </a:p>
+          <a:p>
+            <a:pPr marL="171450" indent="-171450" algn="l">
+              <a:buFont typeface="Arial" panose="020B0604020202020204" pitchFamily="34" charset="0"/>
+              <a:buChar char="•"/>
+            </a:pPr>
+            <a:r>
+              <a:rPr lang="en-US" b="0" i="0" dirty="0">
+                <a:solidFill>
+                  <a:srgbClr val="1F2123"/>
+                </a:solidFill>
+                <a:effectLst/>
+                <a:highlight>
+                  <a:srgbClr val="FBFDFF"/>
+                </a:highlight>
+                <a:latin typeface="Inter"/>
+              </a:rPr>
+              <a:t>Clarity of the presentation</a:t>
+            </a:r>
+          </a:p>
+          <a:p>
+            <a:endParaRPr lang="fr-FR" dirty="0"/>
           </a:p>
         </p:txBody>
       </p:sp>
@@ -8217,7 +8450,7 @@
           <a:p>
             <a:fld id="{341AEC00-4977-4C47-A11B-52155DC12F54}" type="slidenum">
               <a:rPr lang="fr-FR" smtClean="0"/>
-              <a:t>2</a:t>
+              <a:t>1</a:t>
             </a:fld>
             <a:endParaRPr lang="fr-FR"/>
           </a:p>
@@ -8226,7 +8459,7 @@
     </p:spTree>
     <p:extLst>
       <p:ext uri="{BB962C8B-B14F-4D97-AF65-F5344CB8AC3E}">
-        <p14:creationId xmlns:p14="http://schemas.microsoft.com/office/powerpoint/2010/main" val="3328698752"/>
+        <p14:creationId xmlns:p14="http://schemas.microsoft.com/office/powerpoint/2010/main" val="309207184"/>
       </p:ext>
     </p:extLst>
   </p:cSld>
@@ -8280,7 +8513,44 @@
           <a:bodyPr/>
           <a:lstStyle/>
           <a:p>
-            <a:endParaRPr lang="fr-FR" dirty="0"/>
+            <a:r>
+              <a:rPr lang="fr-FR" dirty="0"/>
+              <a:t>Un match tous les 6 </a:t>
+            </a:r>
+            <a:r>
+              <a:rPr lang="fr-FR" dirty="0" err="1"/>
+              <a:t>RdV</a:t>
+            </a:r>
+            <a:r>
+              <a:rPr lang="fr-FR" dirty="0"/>
+              <a:t> 16,5 %</a:t>
+            </a:r>
+          </a:p>
+          <a:p>
+            <a:r>
+              <a:rPr lang="fr-FR" dirty="0"/>
+              <a:t>On propose de finir la soirée sur le dance </a:t>
+            </a:r>
+            <a:r>
+              <a:rPr lang="fr-FR" dirty="0" err="1"/>
+              <a:t>floor</a:t>
+            </a:r>
+            <a:r>
+              <a:rPr lang="fr-FR" dirty="0"/>
+              <a:t> car </a:t>
+            </a:r>
+            <a:r>
+              <a:rPr lang="fr-FR" dirty="0" err="1"/>
+              <a:t>clubing</a:t>
+            </a:r>
+            <a:r>
+              <a:rPr lang="fr-FR" dirty="0"/>
+              <a:t> est l'activité </a:t>
+            </a:r>
+            <a:r>
+              <a:rPr lang="fr-FR"/>
+              <a:t>qui déclenche le plus de matches</a:t>
+            </a:r>
           </a:p>
         </p:txBody>
       </p:sp>
@@ -8299,9 +8569,9 @@
           <a:bodyPr/>
           <a:lstStyle/>
           <a:p>
-            <a:fld id="{15637A7A-FACC-4B9B-AFF9-9B9BAE957224}" type="slidenum">
+            <a:fld id="{341AEC00-4977-4C47-A11B-52155DC12F54}" type="slidenum">
               <a:rPr lang="fr-FR" smtClean="0"/>
-              <a:t>5</a:t>
+              <a:t>2</a:t>
             </a:fld>
             <a:endParaRPr lang="fr-FR"/>
           </a:p>
@@ -8310,7 +8580,7 @@
     </p:spTree>
     <p:extLst>
       <p:ext uri="{BB962C8B-B14F-4D97-AF65-F5344CB8AC3E}">
-        <p14:creationId xmlns:p14="http://schemas.microsoft.com/office/powerpoint/2010/main" val="1849268205"/>
+        <p14:creationId xmlns:p14="http://schemas.microsoft.com/office/powerpoint/2010/main" val="3328698752"/>
       </p:ext>
     </p:extLst>
   </p:cSld>
@@ -8383,6 +8653,90 @@
           <a:bodyPr/>
           <a:lstStyle/>
           <a:p>
+            <a:fld id="{15637A7A-FACC-4B9B-AFF9-9B9BAE957224}" type="slidenum">
+              <a:rPr lang="fr-FR" smtClean="0"/>
+              <a:t>5</a:t>
+            </a:fld>
+            <a:endParaRPr lang="fr-FR"/>
+          </a:p>
+        </p:txBody>
+      </p:sp>
+    </p:spTree>
+    <p:extLst>
+      <p:ext uri="{BB962C8B-B14F-4D97-AF65-F5344CB8AC3E}">
+        <p14:creationId xmlns:p14="http://schemas.microsoft.com/office/powerpoint/2010/main" val="1849268205"/>
+      </p:ext>
+    </p:extLst>
+  </p:cSld>
+  <p:clrMapOvr>
+    <a:masterClrMapping/>
+  </p:clrMapOvr>
+</p:notes>
+</file>
+
+<file path=ppt/notesSlides/notesSlide4.xml><?xml version="1.0" encoding="utf-8"?>
+<p:notes xmlns:a="http://schemas.openxmlformats.org/drawingml/2006/main" xmlns:r="http://schemas.openxmlformats.org/officeDocument/2006/relationships" xmlns:p="http://schemas.openxmlformats.org/presentationml/2006/main">
+  <p:cSld>
+    <p:spTree>
+      <p:nvGrpSpPr>
+        <p:cNvPr id="1" name=""/>
+        <p:cNvGrpSpPr/>
+        <p:nvPr/>
+      </p:nvGrpSpPr>
+      <p:grpSpPr>
+        <a:xfrm>
+          <a:off x="0" y="0"/>
+          <a:ext cx="0" cy="0"/>
+          <a:chOff x="0" y="0"/>
+          <a:chExt cx="0" cy="0"/>
+        </a:xfrm>
+      </p:grpSpPr>
+      <p:sp>
+        <p:nvSpPr>
+          <p:cNvPr id="2" name="Espace réservé de l'image des diapositives 1"/>
+          <p:cNvSpPr>
+            <a:spLocks noGrp="1" noRot="1" noChangeAspect="1"/>
+          </p:cNvSpPr>
+          <p:nvPr>
+            <p:ph type="sldImg"/>
+          </p:nvPr>
+        </p:nvSpPr>
+        <p:spPr/>
+      </p:sp>
+      <p:sp>
+        <p:nvSpPr>
+          <p:cNvPr id="3" name="Espace réservé des notes 2"/>
+          <p:cNvSpPr>
+            <a:spLocks noGrp="1"/>
+          </p:cNvSpPr>
+          <p:nvPr>
+            <p:ph type="body" idx="1"/>
+          </p:nvPr>
+        </p:nvSpPr>
+        <p:spPr/>
+        <p:txBody>
+          <a:bodyPr/>
+          <a:lstStyle/>
+          <a:p>
+            <a:endParaRPr lang="fr-FR" dirty="0"/>
+          </a:p>
+        </p:txBody>
+      </p:sp>
+      <p:sp>
+        <p:nvSpPr>
+          <p:cNvPr id="4" name="Espace réservé du numéro de diapositive 3"/>
+          <p:cNvSpPr>
+            <a:spLocks noGrp="1"/>
+          </p:cNvSpPr>
+          <p:nvPr>
+            <p:ph type="sldNum" sz="quarter" idx="5"/>
+          </p:nvPr>
+        </p:nvSpPr>
+        <p:spPr/>
+        <p:txBody>
+          <a:bodyPr/>
+          <a:lstStyle/>
+          <a:p>
             <a:fld id="{341AEC00-4977-4C47-A11B-52155DC12F54}" type="slidenum">
               <a:rPr lang="fr-FR" smtClean="0"/>
               <a:t>15</a:t>
@@ -8404,7 +8758,7 @@
 </p:notes>
 </file>
 
-<file path=ppt/notesSlides/notesSlide4.xml><?xml version="1.0" encoding="utf-8"?>
+<file path=ppt/notesSlides/notesSlide5.xml><?xml version="1.0" encoding="utf-8"?>
 <p:notes xmlns:a="http://schemas.openxmlformats.org/drawingml/2006/main" xmlns:r="http://schemas.openxmlformats.org/officeDocument/2006/relationships" xmlns:p="http://schemas.openxmlformats.org/presentationml/2006/main">
   <p:cSld>
     <p:spTree>
@@ -8663,7 +9017,7 @@
           <a:p>
             <a:fld id="{7ECB9D5A-E5E4-41FE-AF39-634902D6D5D2}" type="datetimeFigureOut">
               <a:rPr lang="fr-FR" smtClean="0"/>
-              <a:t>24/08/2024</a:t>
+              <a:t>26/08/2024</a:t>
             </a:fld>
             <a:endParaRPr lang="fr-FR"/>
           </a:p>
@@ -8861,7 +9215,7 @@
           <a:p>
             <a:fld id="{7ECB9D5A-E5E4-41FE-AF39-634902D6D5D2}" type="datetimeFigureOut">
               <a:rPr lang="fr-FR" smtClean="0"/>
-              <a:t>24/08/2024</a:t>
+              <a:t>26/08/2024</a:t>
             </a:fld>
             <a:endParaRPr lang="fr-FR"/>
           </a:p>
@@ -9069,7 +9423,7 @@
           <a:p>
             <a:fld id="{7ECB9D5A-E5E4-41FE-AF39-634902D6D5D2}" type="datetimeFigureOut">
               <a:rPr lang="fr-FR" smtClean="0"/>
-              <a:t>24/08/2024</a:t>
+              <a:t>26/08/2024</a:t>
             </a:fld>
             <a:endParaRPr lang="fr-FR"/>
           </a:p>
@@ -9229,7 +9583,7 @@
           </a:ln>
           <a:extLst>
             <a:ext uri="{C572A759-6A51-4108-AA02-DFA0A04FC94B}">
-              <ma14:wrappingTextBoxFlag xmlns="" xmlns:ma14="http://schemas.microsoft.com/office/mac/drawingml/2011/main" val="1"/>
+              <ma14:wrappingTextBoxFlag xmlns:ma14="http://schemas.microsoft.com/office/mac/drawingml/2011/main" xmlns="" val="1"/>
             </a:ext>
           </a:extLst>
         </p:spPr>
@@ -9486,7 +9840,7 @@
           <a:p>
             <a:fld id="{7ECB9D5A-E5E4-41FE-AF39-634902D6D5D2}" type="datetimeFigureOut">
               <a:rPr lang="fr-FR" smtClean="0"/>
-              <a:t>24/08/2024</a:t>
+              <a:t>26/08/2024</a:t>
             </a:fld>
             <a:endParaRPr lang="fr-FR"/>
           </a:p>
@@ -9761,7 +10115,7 @@
           <a:p>
             <a:fld id="{7ECB9D5A-E5E4-41FE-AF39-634902D6D5D2}" type="datetimeFigureOut">
               <a:rPr lang="fr-FR" smtClean="0"/>
-              <a:t>24/08/2024</a:t>
+              <a:t>26/08/2024</a:t>
             </a:fld>
             <a:endParaRPr lang="fr-FR"/>
           </a:p>
@@ -10026,7 +10380,7 @@
           <a:p>
             <a:fld id="{7ECB9D5A-E5E4-41FE-AF39-634902D6D5D2}" type="datetimeFigureOut">
               <a:rPr lang="fr-FR" smtClean="0"/>
-              <a:t>24/08/2024</a:t>
+              <a:t>26/08/2024</a:t>
             </a:fld>
             <a:endParaRPr lang="fr-FR"/>
           </a:p>
@@ -10438,7 +10792,7 @@
           <a:p>
             <a:fld id="{7ECB9D5A-E5E4-41FE-AF39-634902D6D5D2}" type="datetimeFigureOut">
               <a:rPr lang="fr-FR" smtClean="0"/>
-              <a:t>24/08/2024</a:t>
+              <a:t>26/08/2024</a:t>
             </a:fld>
             <a:endParaRPr lang="fr-FR"/>
           </a:p>
@@ -10579,7 +10933,7 @@
           <a:p>
             <a:fld id="{7ECB9D5A-E5E4-41FE-AF39-634902D6D5D2}" type="datetimeFigureOut">
               <a:rPr lang="fr-FR" smtClean="0"/>
-              <a:t>24/08/2024</a:t>
+              <a:t>26/08/2024</a:t>
             </a:fld>
             <a:endParaRPr lang="fr-FR"/>
           </a:p>
@@ -10692,7 +11046,7 @@
           <a:p>
             <a:fld id="{7ECB9D5A-E5E4-41FE-AF39-634902D6D5D2}" type="datetimeFigureOut">
               <a:rPr lang="fr-FR" smtClean="0"/>
-              <a:t>24/08/2024</a:t>
+              <a:t>26/08/2024</a:t>
             </a:fld>
             <a:endParaRPr lang="fr-FR"/>
           </a:p>
@@ -11003,7 +11357,7 @@
           <a:p>
             <a:fld id="{7ECB9D5A-E5E4-41FE-AF39-634902D6D5D2}" type="datetimeFigureOut">
               <a:rPr lang="fr-FR" smtClean="0"/>
-              <a:t>24/08/2024</a:t>
+              <a:t>26/08/2024</a:t>
             </a:fld>
             <a:endParaRPr lang="fr-FR"/>
           </a:p>
@@ -11294,7 +11648,7 @@
           <a:p>
             <a:fld id="{7ECB9D5A-E5E4-41FE-AF39-634902D6D5D2}" type="datetimeFigureOut">
               <a:rPr lang="fr-FR" smtClean="0"/>
-              <a:t>24/08/2024</a:t>
+              <a:t>26/08/2024</a:t>
             </a:fld>
             <a:endParaRPr lang="fr-FR"/>
           </a:p>
@@ -11535,7 +11889,7 @@
           <a:p>
             <a:fld id="{7ECB9D5A-E5E4-41FE-AF39-634902D6D5D2}" type="datetimeFigureOut">
               <a:rPr lang="fr-FR" smtClean="0"/>
-              <a:t>24/08/2024</a:t>
+              <a:t>26/08/2024</a:t>
             </a:fld>
             <a:endParaRPr lang="fr-FR"/>
           </a:p>
@@ -12020,7 +12374,7 @@
             </a:r>
             <a:r>
               <a:rPr lang="fr-FR" sz="1400" dirty="0">
-                <a:hlinkClick r:id="rId2"/>
+                <a:hlinkClick r:id="rId3"/>
               </a:rPr>
               <a:t>philippe.baucour@gmail.com</a:t>
             </a:r>
@@ -12038,7 +12392,7 @@
             </a:r>
             <a:r>
               <a:rPr lang="fr-FR" sz="1400" dirty="0">
-                <a:hlinkClick r:id="rId3"/>
+                <a:hlinkClick r:id="rId4"/>
               </a:rPr>
               <a:t>https://app.jedha.co/course/project-speed-dating-ft/speed-dating-ft</a:t>
             </a:r>
@@ -12052,7 +12406,7 @@
             </a:r>
             <a:r>
               <a:rPr lang="fr-FR" sz="1400" dirty="0">
-                <a:hlinkClick r:id="rId4"/>
+                <a:hlinkClick r:id="rId5"/>
               </a:rPr>
               <a:t>https://github.com/40tude/fullstack_mars_2024_3/tree/main/02_EDA/99_Project_Speed_Dating</a:t>
             </a:r>
@@ -14861,7 +15215,7 @@
           </a:stretch>
         </p:blipFill>
         <p:spPr>
-          <a:xfrm rot="21179438">
+          <a:xfrm rot="21387705">
             <a:off x="367277" y="863593"/>
             <a:ext cx="11283991" cy="4844284"/>
           </a:xfrm>
@@ -14890,9 +15244,9 @@
           <p:nvPr/>
         </p:nvSpPr>
         <p:spPr>
-          <a:xfrm rot="21183964">
-            <a:off x="9523820" y="5192405"/>
-            <a:ext cx="2411238" cy="307777"/>
+          <a:xfrm rot="21345198">
+            <a:off x="9618495" y="5403420"/>
+            <a:ext cx="2151551" cy="307777"/>
           </a:xfrm>
           <a:prstGeom prst="rect">
             <a:avLst/>
@@ -14917,7 +15271,7 @@
                 <a:latin typeface="Times New Roman" panose="02020603050405020304" pitchFamily="18" charset="0"/>
                 <a:cs typeface="Times New Roman" panose="02020603050405020304" pitchFamily="18" charset="0"/>
               </a:rPr>
-              <a:t> 01_speed_dating_v2.ipynb</a:t>
+              <a:t> 02_speed_dating.ipynb</a:t>
             </a:r>
           </a:p>
         </p:txBody>

</xml_diff>

<commit_message>
Relecture pour soutenances 3 sept
</commit_message>
<xml_diff>
--- a/02_EDA/99_Project_Speed_Dating/01_speed_dating_project.pptx
+++ b/02_EDA/99_Project_Speed_Dating/01_speed_dating_project.pptx
@@ -139,7 +139,7 @@
 <file path=ppt/revisionInfo.xml><?xml version="1.0" encoding="utf-8"?>
 <p1510:revInfo xmlns:a="http://schemas.openxmlformats.org/drawingml/2006/main" xmlns:r="http://schemas.openxmlformats.org/officeDocument/2006/relationships" xmlns:p1510="http://schemas.microsoft.com/office/powerpoint/2015/10/main">
   <p1510:revLst>
-    <p1510:client id="{B2EE689F-2065-402A-8908-926DEA39FEF1}" v="26" dt="2024-08-24T09:43:48.481"/>
+    <p1510:client id="{B2EE689F-2065-402A-8908-926DEA39FEF1}" v="27" dt="2024-09-04T14:11:45.088"/>
   </p1510:revLst>
 </p1510:revInfo>
 </file>
@@ -196,7 +196,7 @@
   <pc:docChgLst>
     <pc:chgData name="Philippe Baucour" userId="5102170ae7533958" providerId="LiveId" clId="{B2EE689F-2065-402A-8908-926DEA39FEF1}"/>
     <pc:docChg chg="undo custSel addSld delSld modSld sldOrd">
-      <pc:chgData name="Philippe Baucour" userId="5102170ae7533958" providerId="LiveId" clId="{B2EE689F-2065-402A-8908-926DEA39FEF1}" dt="2024-08-26T09:51:38.387" v="2730" actId="20577"/>
+      <pc:chgData name="Philippe Baucour" userId="5102170ae7533958" providerId="LiveId" clId="{B2EE689F-2065-402A-8908-926DEA39FEF1}" dt="2024-09-04T14:13:33.722" v="3493" actId="20577"/>
       <pc:docMkLst>
         <pc:docMk/>
       </pc:docMkLst>
@@ -223,14 +223,14 @@
           </ac:spMkLst>
         </pc:spChg>
       </pc:sldChg>
-      <pc:sldChg chg="modSp mod">
-        <pc:chgData name="Philippe Baucour" userId="5102170ae7533958" providerId="LiveId" clId="{B2EE689F-2065-402A-8908-926DEA39FEF1}" dt="2024-08-20T16:42:59.488" v="2421" actId="6549"/>
+      <pc:sldChg chg="modSp mod modNotesTx">
+        <pc:chgData name="Philippe Baucour" userId="5102170ae7533958" providerId="LiveId" clId="{B2EE689F-2065-402A-8908-926DEA39FEF1}" dt="2024-09-04T14:13:33.722" v="3493" actId="20577"/>
         <pc:sldMkLst>
           <pc:docMk/>
           <pc:sldMk cId="3201622378" sldId="257"/>
         </pc:sldMkLst>
         <pc:spChg chg="mod">
-          <ac:chgData name="Philippe Baucour" userId="5102170ae7533958" providerId="LiveId" clId="{B2EE689F-2065-402A-8908-926DEA39FEF1}" dt="2024-08-20T16:42:59.488" v="2421" actId="6549"/>
+          <ac:chgData name="Philippe Baucour" userId="5102170ae7533958" providerId="LiveId" clId="{B2EE689F-2065-402A-8908-926DEA39FEF1}" dt="2024-09-04T14:11:21.046" v="3462" actId="20577"/>
           <ac:spMkLst>
             <pc:docMk/>
             <pc:sldMk cId="3201622378" sldId="257"/>
@@ -590,8 +590,8 @@
           </ac:picMkLst>
         </pc:picChg>
       </pc:sldChg>
-      <pc:sldChg chg="modSp new mod">
-        <pc:chgData name="Philippe Baucour" userId="5102170ae7533958" providerId="LiveId" clId="{B2EE689F-2065-402A-8908-926DEA39FEF1}" dt="2024-08-20T15:48:27.513" v="1265" actId="27636"/>
+      <pc:sldChg chg="modSp new mod modNotesTx">
+        <pc:chgData name="Philippe Baucour" userId="5102170ae7533958" providerId="LiveId" clId="{B2EE689F-2065-402A-8908-926DEA39FEF1}" dt="2024-09-04T07:17:24.977" v="3074" actId="20577"/>
         <pc:sldMkLst>
           <pc:docMk/>
           <pc:sldMk cId="2492228979" sldId="270"/>
@@ -614,7 +614,7 @@
         </pc:spChg>
       </pc:sldChg>
       <pc:sldChg chg="addSp delSp modSp new mod modClrScheme chgLayout modNotesTx">
-        <pc:chgData name="Philippe Baucour" userId="5102170ae7533958" providerId="LiveId" clId="{B2EE689F-2065-402A-8908-926DEA39FEF1}" dt="2024-08-20T15:51:05.017" v="1352" actId="6549"/>
+        <pc:chgData name="Philippe Baucour" userId="5102170ae7533958" providerId="LiveId" clId="{B2EE689F-2065-402A-8908-926DEA39FEF1}" dt="2024-09-04T07:26:34.670" v="3324" actId="6549"/>
         <pc:sldMkLst>
           <pc:docMk/>
           <pc:sldMk cId="1525589597" sldId="271"/>
@@ -1045,8 +1045,8 @@
           </ac:picMkLst>
         </pc:picChg>
       </pc:sldChg>
-      <pc:sldChg chg="addSp modSp new mod">
-        <pc:chgData name="Philippe Baucour" userId="5102170ae7533958" providerId="LiveId" clId="{B2EE689F-2065-402A-8908-926DEA39FEF1}" dt="2024-08-20T16:34:41.208" v="1938" actId="1038"/>
+      <pc:sldChg chg="addSp modSp new mod modNotesTx">
+        <pc:chgData name="Philippe Baucour" userId="5102170ae7533958" providerId="LiveId" clId="{B2EE689F-2065-402A-8908-926DEA39FEF1}" dt="2024-09-04T07:09:35.253" v="3069" actId="20577"/>
         <pc:sldMkLst>
           <pc:docMk/>
           <pc:sldMk cId="1712493428" sldId="279"/>
@@ -7848,7 +7848,7 @@
           <a:p>
             <a:fld id="{FD1752CD-A7D2-4825-BC26-9DAEFBD0A5FF}" type="datetimeFigureOut">
               <a:rPr lang="fr-FR" smtClean="0"/>
-              <a:t>26/08/2024</a:t>
+              <a:t>03/09/2024</a:t>
             </a:fld>
             <a:endParaRPr lang="fr-FR"/>
           </a:p>
@@ -8718,6 +8718,69 @@
           <a:bodyPr/>
           <a:lstStyle/>
           <a:p>
+            <a:r>
+              <a:rPr lang="fr-FR" dirty="0"/>
+              <a:t>Je prends le parti d'utiliser des noms de features longs et descriptifs</a:t>
+            </a:r>
+          </a:p>
+          <a:p>
+            <a:endParaRPr lang="fr-FR" dirty="0"/>
+          </a:p>
+          <a:p>
+            <a:r>
+              <a:rPr lang="en-US" b="0" i="0" dirty="0">
+                <a:solidFill>
+                  <a:srgbClr val="CCCCCC"/>
+                </a:solidFill>
+                <a:effectLst/>
+                <a:latin typeface="JetBrains Mono" panose="02000009000000000000" pitchFamily="49" charset="0"/>
+              </a:rPr>
+              <a:t>There are : </a:t>
+            </a:r>
+          </a:p>
+          <a:p>
+            <a:r>
+              <a:rPr lang="en-US" b="0" i="0" dirty="0">
+                <a:solidFill>
+                  <a:srgbClr val="CCCCCC"/>
+                </a:solidFill>
+                <a:effectLst/>
+                <a:latin typeface="JetBrains Mono" panose="02000009000000000000" pitchFamily="49" charset="0"/>
+              </a:rPr>
+              <a:t>260 unique fields of study in the 'field' features. </a:t>
+            </a:r>
+          </a:p>
+          <a:p>
+            <a:r>
+              <a:rPr lang="en-US" b="0" i="0" dirty="0">
+                <a:solidFill>
+                  <a:srgbClr val="CCCCCC"/>
+                </a:solidFill>
+                <a:effectLst/>
+                <a:latin typeface="JetBrains Mono" panose="02000009000000000000" pitchFamily="49" charset="0"/>
+              </a:rPr>
+              <a:t>368 unique </a:t>
+            </a:r>
+            <a:r>
+              <a:rPr lang="en-US" b="0" i="0" dirty="0" err="1">
+                <a:solidFill>
+                  <a:srgbClr val="CCCCCC"/>
+                </a:solidFill>
+                <a:effectLst/>
+                <a:latin typeface="JetBrains Mono" panose="02000009000000000000" pitchFamily="49" charset="0"/>
+              </a:rPr>
+              <a:t>cerreers</a:t>
+            </a:r>
+            <a:r>
+              <a:rPr lang="en-US" b="0" i="0" dirty="0">
+                <a:solidFill>
+                  <a:srgbClr val="CCCCCC"/>
+                </a:solidFill>
+                <a:effectLst/>
+                <a:latin typeface="JetBrains Mono" panose="02000009000000000000" pitchFamily="49" charset="0"/>
+              </a:rPr>
+              <a:t> in the 'career' features.</a:t>
+            </a:r>
             <a:endParaRPr lang="fr-FR" dirty="0"/>
           </a:p>
         </p:txBody>
@@ -8739,7 +8802,7 @@
           <a:p>
             <a:fld id="{341AEC00-4977-4C47-A11B-52155DC12F54}" type="slidenum">
               <a:rPr lang="fr-FR" smtClean="0"/>
-              <a:t>15</a:t>
+              <a:t>13</a:t>
             </a:fld>
             <a:endParaRPr lang="fr-FR"/>
           </a:p>
@@ -8748,7 +8811,7 @@
     </p:spTree>
     <p:extLst>
       <p:ext uri="{BB962C8B-B14F-4D97-AF65-F5344CB8AC3E}">
-        <p14:creationId xmlns:p14="http://schemas.microsoft.com/office/powerpoint/2010/main" val="1744640026"/>
+        <p14:creationId xmlns:p14="http://schemas.microsoft.com/office/powerpoint/2010/main" val="2612515490"/>
       </p:ext>
     </p:extLst>
   </p:cSld>
@@ -8804,29 +8867,445 @@
           <a:p>
             <a:r>
               <a:rPr lang="fr-FR" dirty="0"/>
-              <a:t>Z! Population de "</a:t>
+              <a:t>J'ai créé un </a:t>
             </a:r>
             <a:r>
               <a:rPr lang="fr-FR" dirty="0" err="1"/>
-              <a:t>students</a:t>
+              <a:t>dataframe</a:t>
             </a:r>
             <a:r>
               <a:rPr lang="fr-FR" dirty="0"/>
-              <a:t>" (cf. le doc) </a:t>
-            </a:r>
-          </a:p>
-          <a:p>
-            <a:pPr lvl="1"/>
+              <a:t> "traits" avec que les features qui m'intéresse : genre, </a:t>
+            </a:r>
+            <a:r>
+              <a:rPr lang="fr-FR" dirty="0" err="1"/>
+              <a:t>age</a:t>
+            </a:r>
             <a:r>
               <a:rPr lang="fr-FR" dirty="0"/>
-              <a:t>pas des travailleurs en situation</a:t>
-            </a:r>
-          </a:p>
-          <a:p>
-            <a:pPr lvl="1"/>
+              <a:t>, </a:t>
+            </a:r>
+            <a:r>
+              <a:rPr lang="fr-FR" dirty="0" err="1"/>
+              <a:t>clubbing</a:t>
+            </a:r>
             <a:r>
               <a:rPr lang="fr-FR" dirty="0"/>
-              <a:t>Est-ce que c'est la majorité des clients de Tinder ?</a:t>
+              <a:t>… </a:t>
+            </a:r>
+          </a:p>
+          <a:p>
+            <a:r>
+              <a:rPr lang="fr-FR" dirty="0"/>
+              <a:t>Avec les user unique id</a:t>
+            </a:r>
+          </a:p>
+          <a:p>
+            <a:r>
+              <a:rPr lang="fr-FR" dirty="0"/>
+              <a:t>Supprimé les duplicates</a:t>
+            </a:r>
+          </a:p>
+          <a:p>
+            <a:r>
+              <a:rPr lang="fr-FR" dirty="0"/>
+              <a:t>Après je fais de pivot tables et/ou des graphiques directement</a:t>
+            </a:r>
+            <a:endParaRPr lang="fr-FR" b="0" dirty="0">
+              <a:solidFill>
+                <a:srgbClr val="9CDCFE"/>
+              </a:solidFill>
+              <a:effectLst/>
+              <a:latin typeface="JetBrains Mono" panose="02000009000000000000" pitchFamily="49" charset="0"/>
+            </a:endParaRPr>
+          </a:p>
+          <a:p>
+            <a:pPr marL="0" marR="0" lvl="0" indent="0" algn="l" defTabSz="914400" rtl="0" eaLnBrk="1" fontAlgn="auto" latinLnBrk="0" hangingPunct="1">
+              <a:lnSpc>
+                <a:spcPct val="100000"/>
+              </a:lnSpc>
+              <a:spcBef>
+                <a:spcPts val="0"/>
+              </a:spcBef>
+              <a:spcAft>
+                <a:spcPts val="0"/>
+              </a:spcAft>
+              <a:buClrTx/>
+              <a:buSzTx/>
+              <a:buFontTx/>
+              <a:buNone/>
+              <a:tabLst/>
+              <a:defRPr/>
+            </a:pPr>
+            <a:r>
+              <a:rPr lang="fr-FR" b="0" dirty="0" err="1">
+                <a:solidFill>
+                  <a:srgbClr val="9CDCFE"/>
+                </a:solidFill>
+                <a:effectLst/>
+                <a:latin typeface="JetBrains Mono" panose="02000009000000000000" pitchFamily="49" charset="0"/>
+              </a:rPr>
+              <a:t>pivot_df</a:t>
+            </a:r>
+            <a:r>
+              <a:rPr lang="fr-FR" b="0" dirty="0">
+                <a:solidFill>
+                  <a:srgbClr val="CCCCCC"/>
+                </a:solidFill>
+                <a:effectLst/>
+                <a:latin typeface="JetBrains Mono" panose="02000009000000000000" pitchFamily="49" charset="0"/>
+              </a:rPr>
+              <a:t> </a:t>
+            </a:r>
+            <a:r>
+              <a:rPr lang="fr-FR" b="0" dirty="0">
+                <a:solidFill>
+                  <a:srgbClr val="D4D4D4"/>
+                </a:solidFill>
+                <a:effectLst/>
+                <a:latin typeface="JetBrains Mono" panose="02000009000000000000" pitchFamily="49" charset="0"/>
+              </a:rPr>
+              <a:t>=</a:t>
+            </a:r>
+            <a:r>
+              <a:rPr lang="fr-FR" b="0" dirty="0">
+                <a:solidFill>
+                  <a:srgbClr val="CCCCCC"/>
+                </a:solidFill>
+                <a:effectLst/>
+                <a:latin typeface="JetBrains Mono" panose="02000009000000000000" pitchFamily="49" charset="0"/>
+              </a:rPr>
+              <a:t> </a:t>
+            </a:r>
+            <a:r>
+              <a:rPr lang="fr-FR" b="0" dirty="0" err="1">
+                <a:solidFill>
+                  <a:srgbClr val="9CDCFE"/>
+                </a:solidFill>
+                <a:effectLst/>
+                <a:latin typeface="JetBrains Mono" panose="02000009000000000000" pitchFamily="49" charset="0"/>
+              </a:rPr>
+              <a:t>traits</a:t>
+            </a:r>
+            <a:r>
+              <a:rPr lang="fr-FR" b="0" dirty="0" err="1">
+                <a:solidFill>
+                  <a:srgbClr val="CCCCCC"/>
+                </a:solidFill>
+                <a:effectLst/>
+                <a:latin typeface="JetBrains Mono" panose="02000009000000000000" pitchFamily="49" charset="0"/>
+              </a:rPr>
+              <a:t>.pivot_table</a:t>
+            </a:r>
+            <a:r>
+              <a:rPr lang="fr-FR" b="0" dirty="0">
+                <a:solidFill>
+                  <a:srgbClr val="CCCCCC"/>
+                </a:solidFill>
+                <a:effectLst/>
+                <a:latin typeface="JetBrains Mono" panose="02000009000000000000" pitchFamily="49" charset="0"/>
+              </a:rPr>
+              <a:t>(</a:t>
+            </a:r>
+            <a:r>
+              <a:rPr lang="fr-FR" b="0" dirty="0">
+                <a:solidFill>
+                  <a:srgbClr val="9CDCFE"/>
+                </a:solidFill>
+                <a:effectLst/>
+                <a:latin typeface="JetBrains Mono" panose="02000009000000000000" pitchFamily="49" charset="0"/>
+              </a:rPr>
+              <a:t>index</a:t>
+            </a:r>
+            <a:r>
+              <a:rPr lang="fr-FR" b="0" dirty="0">
+                <a:solidFill>
+                  <a:srgbClr val="D4D4D4"/>
+                </a:solidFill>
+                <a:effectLst/>
+                <a:latin typeface="JetBrains Mono" panose="02000009000000000000" pitchFamily="49" charset="0"/>
+              </a:rPr>
+              <a:t>=</a:t>
+            </a:r>
+            <a:r>
+              <a:rPr lang="fr-FR" b="0" dirty="0">
+                <a:solidFill>
+                  <a:srgbClr val="CE9178"/>
+                </a:solidFill>
+                <a:effectLst/>
+                <a:latin typeface="JetBrains Mono" panose="02000009000000000000" pitchFamily="49" charset="0"/>
+              </a:rPr>
+              <a:t>'</a:t>
+            </a:r>
+            <a:r>
+              <a:rPr lang="fr-FR" b="0" dirty="0" err="1">
+                <a:solidFill>
+                  <a:srgbClr val="CE9178"/>
+                </a:solidFill>
+                <a:effectLst/>
+                <a:latin typeface="JetBrains Mono" panose="02000009000000000000" pitchFamily="49" charset="0"/>
+              </a:rPr>
+              <a:t>gender_description</a:t>
+            </a:r>
+            <a:r>
+              <a:rPr lang="fr-FR" b="0" dirty="0">
+                <a:solidFill>
+                  <a:srgbClr val="CE9178"/>
+                </a:solidFill>
+                <a:effectLst/>
+                <a:latin typeface="JetBrains Mono" panose="02000009000000000000" pitchFamily="49" charset="0"/>
+              </a:rPr>
+              <a:t>'</a:t>
+            </a:r>
+            <a:r>
+              <a:rPr lang="fr-FR" b="0" dirty="0">
+                <a:solidFill>
+                  <a:srgbClr val="CCCCCC"/>
+                </a:solidFill>
+                <a:effectLst/>
+                <a:latin typeface="JetBrains Mono" panose="02000009000000000000" pitchFamily="49" charset="0"/>
+              </a:rPr>
+              <a:t>, </a:t>
+            </a:r>
+            <a:r>
+              <a:rPr lang="fr-FR" b="0" dirty="0" err="1">
+                <a:solidFill>
+                  <a:srgbClr val="9CDCFE"/>
+                </a:solidFill>
+                <a:effectLst/>
+                <a:latin typeface="JetBrains Mono" panose="02000009000000000000" pitchFamily="49" charset="0"/>
+              </a:rPr>
+              <a:t>columns</a:t>
+            </a:r>
+            <a:r>
+              <a:rPr lang="fr-FR" b="0" dirty="0">
+                <a:solidFill>
+                  <a:srgbClr val="D4D4D4"/>
+                </a:solidFill>
+                <a:effectLst/>
+                <a:latin typeface="JetBrains Mono" panose="02000009000000000000" pitchFamily="49" charset="0"/>
+              </a:rPr>
+              <a:t>=</a:t>
+            </a:r>
+            <a:r>
+              <a:rPr lang="fr-FR" b="0" dirty="0">
+                <a:solidFill>
+                  <a:srgbClr val="CE9178"/>
+                </a:solidFill>
+                <a:effectLst/>
+                <a:latin typeface="JetBrains Mono" panose="02000009000000000000" pitchFamily="49" charset="0"/>
+              </a:rPr>
+              <a:t>'</a:t>
+            </a:r>
+            <a:r>
+              <a:rPr lang="fr-FR" b="0" dirty="0" err="1">
+                <a:solidFill>
+                  <a:srgbClr val="CE9178"/>
+                </a:solidFill>
+                <a:effectLst/>
+                <a:latin typeface="JetBrains Mono" panose="02000009000000000000" pitchFamily="49" charset="0"/>
+              </a:rPr>
+              <a:t>age</a:t>
+            </a:r>
+            <a:r>
+              <a:rPr lang="fr-FR" b="0" dirty="0">
+                <a:solidFill>
+                  <a:srgbClr val="CE9178"/>
+                </a:solidFill>
+                <a:effectLst/>
+                <a:latin typeface="JetBrains Mono" panose="02000009000000000000" pitchFamily="49" charset="0"/>
+              </a:rPr>
+              <a:t>'</a:t>
+            </a:r>
+            <a:r>
+              <a:rPr lang="fr-FR" b="0" dirty="0">
+                <a:solidFill>
+                  <a:srgbClr val="CCCCCC"/>
+                </a:solidFill>
+                <a:effectLst/>
+                <a:latin typeface="JetBrains Mono" panose="02000009000000000000" pitchFamily="49" charset="0"/>
+              </a:rPr>
+              <a:t>, </a:t>
+            </a:r>
+            <a:r>
+              <a:rPr lang="fr-FR" b="0" dirty="0">
+                <a:solidFill>
+                  <a:srgbClr val="9CDCFE"/>
+                </a:solidFill>
+                <a:effectLst/>
+                <a:latin typeface="JetBrains Mono" panose="02000009000000000000" pitchFamily="49" charset="0"/>
+              </a:rPr>
+              <a:t>values</a:t>
+            </a:r>
+            <a:r>
+              <a:rPr lang="fr-FR" b="0" dirty="0">
+                <a:solidFill>
+                  <a:srgbClr val="D4D4D4"/>
+                </a:solidFill>
+                <a:effectLst/>
+                <a:latin typeface="JetBrains Mono" panose="02000009000000000000" pitchFamily="49" charset="0"/>
+              </a:rPr>
+              <a:t>=</a:t>
+            </a:r>
+            <a:r>
+              <a:rPr lang="fr-FR" b="0" dirty="0">
+                <a:solidFill>
+                  <a:srgbClr val="CE9178"/>
+                </a:solidFill>
+                <a:effectLst/>
+                <a:latin typeface="JetBrains Mono" panose="02000009000000000000" pitchFamily="49" charset="0"/>
+              </a:rPr>
+              <a:t>'</a:t>
+            </a:r>
+            <a:r>
+              <a:rPr lang="fr-FR" b="0" dirty="0" err="1">
+                <a:solidFill>
+                  <a:srgbClr val="CE9178"/>
+                </a:solidFill>
+                <a:effectLst/>
+                <a:latin typeface="JetBrains Mono" panose="02000009000000000000" pitchFamily="49" charset="0"/>
+              </a:rPr>
+              <a:t>participant_uid</a:t>
+            </a:r>
+            <a:r>
+              <a:rPr lang="fr-FR" b="0" dirty="0">
+                <a:solidFill>
+                  <a:srgbClr val="CE9178"/>
+                </a:solidFill>
+                <a:effectLst/>
+                <a:latin typeface="JetBrains Mono" panose="02000009000000000000" pitchFamily="49" charset="0"/>
+              </a:rPr>
+              <a:t>'</a:t>
+            </a:r>
+            <a:r>
+              <a:rPr lang="fr-FR" b="0" dirty="0">
+                <a:solidFill>
+                  <a:srgbClr val="CCCCCC"/>
+                </a:solidFill>
+                <a:effectLst/>
+                <a:latin typeface="JetBrains Mono" panose="02000009000000000000" pitchFamily="49" charset="0"/>
+              </a:rPr>
+              <a:t>, </a:t>
+            </a:r>
+            <a:r>
+              <a:rPr lang="fr-FR" b="0" dirty="0" err="1">
+                <a:solidFill>
+                  <a:srgbClr val="9CDCFE"/>
+                </a:solidFill>
+                <a:effectLst/>
+                <a:latin typeface="JetBrains Mono" panose="02000009000000000000" pitchFamily="49" charset="0"/>
+              </a:rPr>
+              <a:t>aggfunc</a:t>
+            </a:r>
+            <a:r>
+              <a:rPr lang="fr-FR" b="0" dirty="0">
+                <a:solidFill>
+                  <a:srgbClr val="D4D4D4"/>
+                </a:solidFill>
+                <a:effectLst/>
+                <a:latin typeface="JetBrains Mono" panose="02000009000000000000" pitchFamily="49" charset="0"/>
+              </a:rPr>
+              <a:t>=</a:t>
+            </a:r>
+            <a:r>
+              <a:rPr lang="fr-FR" b="0" dirty="0">
+                <a:solidFill>
+                  <a:srgbClr val="CE9178"/>
+                </a:solidFill>
+                <a:effectLst/>
+                <a:latin typeface="JetBrains Mono" panose="02000009000000000000" pitchFamily="49" charset="0"/>
+              </a:rPr>
+              <a:t>'count'</a:t>
+            </a:r>
+            <a:r>
+              <a:rPr lang="fr-FR" b="0" dirty="0">
+                <a:solidFill>
+                  <a:srgbClr val="CCCCCC"/>
+                </a:solidFill>
+                <a:effectLst/>
+                <a:latin typeface="JetBrains Mono" panose="02000009000000000000" pitchFamily="49" charset="0"/>
+              </a:rPr>
+              <a:t>, </a:t>
+            </a:r>
+            <a:r>
+              <a:rPr lang="fr-FR" b="0" dirty="0" err="1">
+                <a:solidFill>
+                  <a:srgbClr val="9CDCFE"/>
+                </a:solidFill>
+                <a:effectLst/>
+                <a:latin typeface="JetBrains Mono" panose="02000009000000000000" pitchFamily="49" charset="0"/>
+              </a:rPr>
+              <a:t>margins</a:t>
+            </a:r>
+            <a:r>
+              <a:rPr lang="fr-FR" b="0" dirty="0">
+                <a:solidFill>
+                  <a:srgbClr val="D4D4D4"/>
+                </a:solidFill>
+                <a:effectLst/>
+                <a:latin typeface="JetBrains Mono" panose="02000009000000000000" pitchFamily="49" charset="0"/>
+              </a:rPr>
+              <a:t>=</a:t>
+            </a:r>
+            <a:r>
+              <a:rPr lang="fr-FR" b="0" dirty="0">
+                <a:solidFill>
+                  <a:srgbClr val="569CD6"/>
+                </a:solidFill>
+                <a:effectLst/>
+                <a:latin typeface="JetBrains Mono" panose="02000009000000000000" pitchFamily="49" charset="0"/>
+              </a:rPr>
+              <a:t>True</a:t>
+            </a:r>
+            <a:r>
+              <a:rPr lang="fr-FR" b="0" dirty="0">
+                <a:solidFill>
+                  <a:srgbClr val="CCCCCC"/>
+                </a:solidFill>
+                <a:effectLst/>
+                <a:latin typeface="JetBrains Mono" panose="02000009000000000000" pitchFamily="49" charset="0"/>
+              </a:rPr>
+              <a:t>, </a:t>
+            </a:r>
+            <a:r>
+              <a:rPr lang="fr-FR" b="0" dirty="0" err="1">
+                <a:solidFill>
+                  <a:srgbClr val="9CDCFE"/>
+                </a:solidFill>
+                <a:effectLst/>
+                <a:latin typeface="JetBrains Mono" panose="02000009000000000000" pitchFamily="49" charset="0"/>
+              </a:rPr>
+              <a:t>margins_name</a:t>
+            </a:r>
+            <a:r>
+              <a:rPr lang="fr-FR" b="0" dirty="0">
+                <a:solidFill>
+                  <a:srgbClr val="D4D4D4"/>
+                </a:solidFill>
+                <a:effectLst/>
+                <a:latin typeface="JetBrains Mono" panose="02000009000000000000" pitchFamily="49" charset="0"/>
+              </a:rPr>
+              <a:t>=</a:t>
+            </a:r>
+            <a:r>
+              <a:rPr lang="fr-FR" b="0" dirty="0">
+                <a:solidFill>
+                  <a:srgbClr val="CE9178"/>
+                </a:solidFill>
+                <a:effectLst/>
+                <a:latin typeface="JetBrains Mono" panose="02000009000000000000" pitchFamily="49" charset="0"/>
+              </a:rPr>
+              <a:t>"Total"</a:t>
+            </a:r>
+            <a:r>
+              <a:rPr lang="fr-FR" b="0" dirty="0">
+                <a:solidFill>
+                  <a:srgbClr val="CCCCCC"/>
+                </a:solidFill>
+                <a:effectLst/>
+                <a:latin typeface="JetBrains Mono" panose="02000009000000000000" pitchFamily="49" charset="0"/>
+              </a:rPr>
+              <a:t>)</a:t>
             </a:r>
           </a:p>
           <a:p>
@@ -8851,6 +9330,118 @@
           <a:p>
             <a:fld id="{341AEC00-4977-4C47-A11B-52155DC12F54}" type="slidenum">
               <a:rPr lang="fr-FR" smtClean="0"/>
+              <a:t>15</a:t>
+            </a:fld>
+            <a:endParaRPr lang="fr-FR"/>
+          </a:p>
+        </p:txBody>
+      </p:sp>
+    </p:spTree>
+    <p:extLst>
+      <p:ext uri="{BB962C8B-B14F-4D97-AF65-F5344CB8AC3E}">
+        <p14:creationId xmlns:p14="http://schemas.microsoft.com/office/powerpoint/2010/main" val="1744640026"/>
+      </p:ext>
+    </p:extLst>
+  </p:cSld>
+  <p:clrMapOvr>
+    <a:masterClrMapping/>
+  </p:clrMapOvr>
+</p:notes>
+</file>
+
+<file path=ppt/notesSlides/notesSlide6.xml><?xml version="1.0" encoding="utf-8"?>
+<p:notes xmlns:a="http://schemas.openxmlformats.org/drawingml/2006/main" xmlns:r="http://schemas.openxmlformats.org/officeDocument/2006/relationships" xmlns:p="http://schemas.openxmlformats.org/presentationml/2006/main">
+  <p:cSld>
+    <p:spTree>
+      <p:nvGrpSpPr>
+        <p:cNvPr id="1" name=""/>
+        <p:cNvGrpSpPr/>
+        <p:nvPr/>
+      </p:nvGrpSpPr>
+      <p:grpSpPr>
+        <a:xfrm>
+          <a:off x="0" y="0"/>
+          <a:ext cx="0" cy="0"/>
+          <a:chOff x="0" y="0"/>
+          <a:chExt cx="0" cy="0"/>
+        </a:xfrm>
+      </p:grpSpPr>
+      <p:sp>
+        <p:nvSpPr>
+          <p:cNvPr id="2" name="Espace réservé de l'image des diapositives 1"/>
+          <p:cNvSpPr>
+            <a:spLocks noGrp="1" noRot="1" noChangeAspect="1"/>
+          </p:cNvSpPr>
+          <p:nvPr>
+            <p:ph type="sldImg"/>
+          </p:nvPr>
+        </p:nvSpPr>
+        <p:spPr/>
+      </p:sp>
+      <p:sp>
+        <p:nvSpPr>
+          <p:cNvPr id="3" name="Espace réservé des notes 2"/>
+          <p:cNvSpPr>
+            <a:spLocks noGrp="1"/>
+          </p:cNvSpPr>
+          <p:nvPr>
+            <p:ph type="body" idx="1"/>
+          </p:nvPr>
+        </p:nvSpPr>
+        <p:spPr/>
+        <p:txBody>
+          <a:bodyPr/>
+          <a:lstStyle/>
+          <a:p>
+            <a:r>
+              <a:rPr lang="fr-FR" dirty="0"/>
+              <a:t>Z! Population de "</a:t>
+            </a:r>
+            <a:r>
+              <a:rPr lang="fr-FR" dirty="0" err="1"/>
+              <a:t>students</a:t>
+            </a:r>
+            <a:r>
+              <a:rPr lang="fr-FR" dirty="0"/>
+              <a:t>" (cf. le doc) </a:t>
+            </a:r>
+          </a:p>
+          <a:p>
+            <a:pPr lvl="1"/>
+            <a:r>
+              <a:rPr lang="fr-FR" dirty="0"/>
+              <a:t>pas des travailleurs en situation</a:t>
+            </a:r>
+          </a:p>
+          <a:p>
+            <a:pPr lvl="1"/>
+            <a:r>
+              <a:rPr lang="fr-FR" dirty="0"/>
+              <a:t>Est-ce que c'est la majorité des clients de Tinder ?</a:t>
+            </a:r>
+          </a:p>
+          <a:p>
+            <a:endParaRPr lang="fr-FR" dirty="0"/>
+          </a:p>
+        </p:txBody>
+      </p:sp>
+      <p:sp>
+        <p:nvSpPr>
+          <p:cNvPr id="4" name="Espace réservé du numéro de diapositive 3"/>
+          <p:cNvSpPr>
+            <a:spLocks noGrp="1"/>
+          </p:cNvSpPr>
+          <p:nvPr>
+            <p:ph type="sldNum" sz="quarter" idx="5"/>
+          </p:nvPr>
+        </p:nvSpPr>
+        <p:spPr/>
+        <p:txBody>
+          <a:bodyPr/>
+          <a:lstStyle/>
+          <a:p>
+            <a:fld id="{341AEC00-4977-4C47-A11B-52155DC12F54}" type="slidenum">
+              <a:rPr lang="fr-FR" smtClean="0"/>
               <a:t>19</a:t>
             </a:fld>
             <a:endParaRPr lang="fr-FR"/>
@@ -8861,6 +9452,258 @@
     <p:extLst>
       <p:ext uri="{BB962C8B-B14F-4D97-AF65-F5344CB8AC3E}">
         <p14:creationId xmlns:p14="http://schemas.microsoft.com/office/powerpoint/2010/main" val="509833682"/>
+      </p:ext>
+    </p:extLst>
+  </p:cSld>
+  <p:clrMapOvr>
+    <a:masterClrMapping/>
+  </p:clrMapOvr>
+</p:notes>
+</file>
+
+<file path=ppt/notesSlides/notesSlide7.xml><?xml version="1.0" encoding="utf-8"?>
+<p:notes xmlns:a="http://schemas.openxmlformats.org/drawingml/2006/main" xmlns:r="http://schemas.openxmlformats.org/officeDocument/2006/relationships" xmlns:p="http://schemas.openxmlformats.org/presentationml/2006/main">
+  <p:cSld>
+    <p:spTree>
+      <p:nvGrpSpPr>
+        <p:cNvPr id="1" name=""/>
+        <p:cNvGrpSpPr/>
+        <p:nvPr/>
+      </p:nvGrpSpPr>
+      <p:grpSpPr>
+        <a:xfrm>
+          <a:off x="0" y="0"/>
+          <a:ext cx="0" cy="0"/>
+          <a:chOff x="0" y="0"/>
+          <a:chExt cx="0" cy="0"/>
+        </a:xfrm>
+      </p:grpSpPr>
+      <p:sp>
+        <p:nvSpPr>
+          <p:cNvPr id="2" name="Espace réservé de l'image des diapositives 1"/>
+          <p:cNvSpPr>
+            <a:spLocks noGrp="1" noRot="1" noChangeAspect="1"/>
+          </p:cNvSpPr>
+          <p:nvPr>
+            <p:ph type="sldImg"/>
+          </p:nvPr>
+        </p:nvSpPr>
+        <p:spPr/>
+      </p:sp>
+      <p:sp>
+        <p:nvSpPr>
+          <p:cNvPr id="3" name="Espace réservé des notes 2"/>
+          <p:cNvSpPr>
+            <a:spLocks noGrp="1"/>
+          </p:cNvSpPr>
+          <p:nvPr>
+            <p:ph type="body" idx="1"/>
+          </p:nvPr>
+        </p:nvSpPr>
+        <p:spPr/>
+        <p:txBody>
+          <a:bodyPr/>
+          <a:lstStyle/>
+          <a:p>
+            <a:r>
+              <a:rPr lang="fr-FR" dirty="0"/>
+              <a:t>Q1 : la confiance n'interdit pas le contrôle </a:t>
+            </a:r>
+            <a:r>
+              <a:rPr lang="fr-FR" dirty="0">
+                <a:sym typeface="Wingdings" panose="05000000000000000000" pitchFamily="2" charset="2"/>
+              </a:rPr>
+              <a:t></a:t>
+            </a:r>
+          </a:p>
+          <a:p>
+            <a:r>
+              <a:rPr lang="fr-FR" dirty="0">
+                <a:sym typeface="Wingdings" panose="05000000000000000000" pitchFamily="2" charset="2"/>
+              </a:rPr>
+              <a:t>Suffit de faire une pivot table sur le dataset en regardant sur l'ensemble des "matches" ceux où les participants repérés par leur </a:t>
+            </a:r>
+            <a:r>
+              <a:rPr lang="fr-FR" dirty="0" err="1">
+                <a:sym typeface="Wingdings" panose="05000000000000000000" pitchFamily="2" charset="2"/>
+              </a:rPr>
+              <a:t>user_id</a:t>
+            </a:r>
+            <a:r>
+              <a:rPr lang="fr-FR" dirty="0">
+                <a:sym typeface="Wingdings" panose="05000000000000000000" pitchFamily="2" charset="2"/>
+              </a:rPr>
+              <a:t> avaient la même race ou pas</a:t>
+            </a:r>
+            <a:endParaRPr lang="fr-FR" dirty="0"/>
+          </a:p>
+        </p:txBody>
+      </p:sp>
+      <p:sp>
+        <p:nvSpPr>
+          <p:cNvPr id="4" name="Espace réservé du numéro de diapositive 3"/>
+          <p:cNvSpPr>
+            <a:spLocks noGrp="1"/>
+          </p:cNvSpPr>
+          <p:nvPr>
+            <p:ph type="sldNum" sz="quarter" idx="5"/>
+          </p:nvPr>
+        </p:nvSpPr>
+        <p:spPr/>
+        <p:txBody>
+          <a:bodyPr/>
+          <a:lstStyle/>
+          <a:p>
+            <a:fld id="{341AEC00-4977-4C47-A11B-52155DC12F54}" type="slidenum">
+              <a:rPr lang="fr-FR" smtClean="0"/>
+              <a:t>20</a:t>
+            </a:fld>
+            <a:endParaRPr lang="fr-FR"/>
+          </a:p>
+        </p:txBody>
+      </p:sp>
+    </p:spTree>
+    <p:extLst>
+      <p:ext uri="{BB962C8B-B14F-4D97-AF65-F5344CB8AC3E}">
+        <p14:creationId xmlns:p14="http://schemas.microsoft.com/office/powerpoint/2010/main" val="519823156"/>
+      </p:ext>
+    </p:extLst>
+  </p:cSld>
+  <p:clrMapOvr>
+    <a:masterClrMapping/>
+  </p:clrMapOvr>
+</p:notes>
+</file>
+
+<file path=ppt/notesSlides/notesSlide8.xml><?xml version="1.0" encoding="utf-8"?>
+<p:notes xmlns:a="http://schemas.openxmlformats.org/drawingml/2006/main" xmlns:r="http://schemas.openxmlformats.org/officeDocument/2006/relationships" xmlns:p="http://schemas.openxmlformats.org/presentationml/2006/main">
+  <p:cSld>
+    <p:spTree>
+      <p:nvGrpSpPr>
+        <p:cNvPr id="1" name=""/>
+        <p:cNvGrpSpPr/>
+        <p:nvPr/>
+      </p:nvGrpSpPr>
+      <p:grpSpPr>
+        <a:xfrm>
+          <a:off x="0" y="0"/>
+          <a:ext cx="0" cy="0"/>
+          <a:chOff x="0" y="0"/>
+          <a:chExt cx="0" cy="0"/>
+        </a:xfrm>
+      </p:grpSpPr>
+      <p:sp>
+        <p:nvSpPr>
+          <p:cNvPr id="2" name="Espace réservé de l'image des diapositives 1"/>
+          <p:cNvSpPr>
+            <a:spLocks noGrp="1" noRot="1" noChangeAspect="1"/>
+          </p:cNvSpPr>
+          <p:nvPr>
+            <p:ph type="sldImg"/>
+          </p:nvPr>
+        </p:nvSpPr>
+        <p:spPr/>
+      </p:sp>
+      <p:sp>
+        <p:nvSpPr>
+          <p:cNvPr id="3" name="Espace réservé des notes 2"/>
+          <p:cNvSpPr>
+            <a:spLocks noGrp="1"/>
+          </p:cNvSpPr>
+          <p:nvPr>
+            <p:ph type="body" idx="1"/>
+          </p:nvPr>
+        </p:nvSpPr>
+        <p:spPr/>
+        <p:txBody>
+          <a:bodyPr/>
+          <a:lstStyle/>
+          <a:p>
+            <a:r>
+              <a:rPr lang="en-US" dirty="0"/>
+              <a:t>EDA                     	: The recipe</a:t>
+            </a:r>
+          </a:p>
+          <a:p>
+            <a:r>
+              <a:rPr lang="en-US" dirty="0"/>
+              <a:t>Features Engineering	: The secret sauce</a:t>
+            </a:r>
+          </a:p>
+          <a:p>
+            <a:r>
+              <a:rPr lang="en-US" dirty="0"/>
+              <a:t>Baseline model          	: The first taste</a:t>
+            </a:r>
+          </a:p>
+          <a:p>
+            <a:r>
+              <a:rPr lang="en-US" dirty="0"/>
+              <a:t>Interpreting results    	: The tasting notes</a:t>
+            </a:r>
+          </a:p>
+          <a:p>
+            <a:endParaRPr lang="en-US" dirty="0"/>
+          </a:p>
+          <a:p>
+            <a:r>
+              <a:rPr lang="en-US" dirty="0"/>
+              <a:t>Don't mess with EDA     	: Never!</a:t>
+            </a:r>
+          </a:p>
+          <a:p>
+            <a:r>
+              <a:rPr lang="en-US" dirty="0"/>
+              <a:t>Feature engineering	: Smart!</a:t>
+            </a:r>
+          </a:p>
+          <a:p>
+            <a:r>
+              <a:rPr lang="en-US" dirty="0"/>
+              <a:t>Get a baseline model    	: Fast!</a:t>
+            </a:r>
+          </a:p>
+          <a:p>
+            <a:r>
+              <a:rPr lang="en-US" dirty="0"/>
+              <a:t>Results analysis        	: Always! </a:t>
+            </a:r>
+          </a:p>
+          <a:p>
+            <a:endParaRPr lang="en-US" dirty="0"/>
+          </a:p>
+          <a:p>
+            <a:endParaRPr lang="fr-FR" dirty="0"/>
+          </a:p>
+        </p:txBody>
+      </p:sp>
+      <p:sp>
+        <p:nvSpPr>
+          <p:cNvPr id="4" name="Espace réservé du numéro de diapositive 3"/>
+          <p:cNvSpPr>
+            <a:spLocks noGrp="1"/>
+          </p:cNvSpPr>
+          <p:nvPr>
+            <p:ph type="sldNum" sz="quarter" idx="5"/>
+          </p:nvPr>
+        </p:nvSpPr>
+        <p:spPr/>
+        <p:txBody>
+          <a:bodyPr/>
+          <a:lstStyle/>
+          <a:p>
+            <a:fld id="{341AEC00-4977-4C47-A11B-52155DC12F54}" type="slidenum">
+              <a:rPr lang="fr-FR" smtClean="0"/>
+              <a:t>21</a:t>
+            </a:fld>
+            <a:endParaRPr lang="fr-FR"/>
+          </a:p>
+        </p:txBody>
+      </p:sp>
+    </p:spTree>
+    <p:extLst>
+      <p:ext uri="{BB962C8B-B14F-4D97-AF65-F5344CB8AC3E}">
+        <p14:creationId xmlns:p14="http://schemas.microsoft.com/office/powerpoint/2010/main" val="3638500024"/>
       </p:ext>
     </p:extLst>
   </p:cSld>
@@ -9017,7 +9860,7 @@
           <a:p>
             <a:fld id="{7ECB9D5A-E5E4-41FE-AF39-634902D6D5D2}" type="datetimeFigureOut">
               <a:rPr lang="fr-FR" smtClean="0"/>
-              <a:t>26/08/2024</a:t>
+              <a:t>03/09/2024</a:t>
             </a:fld>
             <a:endParaRPr lang="fr-FR"/>
           </a:p>
@@ -9215,7 +10058,7 @@
           <a:p>
             <a:fld id="{7ECB9D5A-E5E4-41FE-AF39-634902D6D5D2}" type="datetimeFigureOut">
               <a:rPr lang="fr-FR" smtClean="0"/>
-              <a:t>26/08/2024</a:t>
+              <a:t>03/09/2024</a:t>
             </a:fld>
             <a:endParaRPr lang="fr-FR"/>
           </a:p>
@@ -9423,7 +10266,7 @@
           <a:p>
             <a:fld id="{7ECB9D5A-E5E4-41FE-AF39-634902D6D5D2}" type="datetimeFigureOut">
               <a:rPr lang="fr-FR" smtClean="0"/>
-              <a:t>26/08/2024</a:t>
+              <a:t>03/09/2024</a:t>
             </a:fld>
             <a:endParaRPr lang="fr-FR"/>
           </a:p>
@@ -9583,7 +10426,7 @@
           </a:ln>
           <a:extLst>
             <a:ext uri="{C572A759-6A51-4108-AA02-DFA0A04FC94B}">
-              <ma14:wrappingTextBoxFlag xmlns:ma14="http://schemas.microsoft.com/office/mac/drawingml/2011/main" xmlns="" val="1"/>
+              <ma14:wrappingTextBoxFlag xmlns="" xmlns:ma14="http://schemas.microsoft.com/office/mac/drawingml/2011/main" val="1"/>
             </a:ext>
           </a:extLst>
         </p:spPr>
@@ -9840,7 +10683,7 @@
           <a:p>
             <a:fld id="{7ECB9D5A-E5E4-41FE-AF39-634902D6D5D2}" type="datetimeFigureOut">
               <a:rPr lang="fr-FR" smtClean="0"/>
-              <a:t>26/08/2024</a:t>
+              <a:t>03/09/2024</a:t>
             </a:fld>
             <a:endParaRPr lang="fr-FR"/>
           </a:p>
@@ -10115,7 +10958,7 @@
           <a:p>
             <a:fld id="{7ECB9D5A-E5E4-41FE-AF39-634902D6D5D2}" type="datetimeFigureOut">
               <a:rPr lang="fr-FR" smtClean="0"/>
-              <a:t>26/08/2024</a:t>
+              <a:t>03/09/2024</a:t>
             </a:fld>
             <a:endParaRPr lang="fr-FR"/>
           </a:p>
@@ -10380,7 +11223,7 @@
           <a:p>
             <a:fld id="{7ECB9D5A-E5E4-41FE-AF39-634902D6D5D2}" type="datetimeFigureOut">
               <a:rPr lang="fr-FR" smtClean="0"/>
-              <a:t>26/08/2024</a:t>
+              <a:t>03/09/2024</a:t>
             </a:fld>
             <a:endParaRPr lang="fr-FR"/>
           </a:p>
@@ -10792,7 +11635,7 @@
           <a:p>
             <a:fld id="{7ECB9D5A-E5E4-41FE-AF39-634902D6D5D2}" type="datetimeFigureOut">
               <a:rPr lang="fr-FR" smtClean="0"/>
-              <a:t>26/08/2024</a:t>
+              <a:t>03/09/2024</a:t>
             </a:fld>
             <a:endParaRPr lang="fr-FR"/>
           </a:p>
@@ -10933,7 +11776,7 @@
           <a:p>
             <a:fld id="{7ECB9D5A-E5E4-41FE-AF39-634902D6D5D2}" type="datetimeFigureOut">
               <a:rPr lang="fr-FR" smtClean="0"/>
-              <a:t>26/08/2024</a:t>
+              <a:t>03/09/2024</a:t>
             </a:fld>
             <a:endParaRPr lang="fr-FR"/>
           </a:p>
@@ -11046,7 +11889,7 @@
           <a:p>
             <a:fld id="{7ECB9D5A-E5E4-41FE-AF39-634902D6D5D2}" type="datetimeFigureOut">
               <a:rPr lang="fr-FR" smtClean="0"/>
-              <a:t>26/08/2024</a:t>
+              <a:t>03/09/2024</a:t>
             </a:fld>
             <a:endParaRPr lang="fr-FR"/>
           </a:p>
@@ -11357,7 +12200,7 @@
           <a:p>
             <a:fld id="{7ECB9D5A-E5E4-41FE-AF39-634902D6D5D2}" type="datetimeFigureOut">
               <a:rPr lang="fr-FR" smtClean="0"/>
-              <a:t>26/08/2024</a:t>
+              <a:t>03/09/2024</a:t>
             </a:fld>
             <a:endParaRPr lang="fr-FR"/>
           </a:p>
@@ -11648,7 +12491,7 @@
           <a:p>
             <a:fld id="{7ECB9D5A-E5E4-41FE-AF39-634902D6D5D2}" type="datetimeFigureOut">
               <a:rPr lang="fr-FR" smtClean="0"/>
-              <a:t>26/08/2024</a:t>
+              <a:t>03/09/2024</a:t>
             </a:fld>
             <a:endParaRPr lang="fr-FR"/>
           </a:p>
@@ -11889,7 +12732,7 @@
           <a:p>
             <a:fld id="{7ECB9D5A-E5E4-41FE-AF39-634902D6D5D2}" type="datetimeFigureOut">
               <a:rPr lang="fr-FR" smtClean="0"/>
-              <a:t>26/08/2024</a:t>
+              <a:t>03/09/2024</a:t>
             </a:fld>
             <a:endParaRPr lang="fr-FR"/>
           </a:p>
@@ -15462,7 +16305,7 @@
           <p:nvPr/>
         </p:nvPicPr>
         <p:blipFill>
-          <a:blip r:embed="rId2"/>
+          <a:blip r:embed="rId3"/>
           <a:stretch>
             <a:fillRect/>
           </a:stretch>
@@ -15492,7 +16335,7 @@
           <p:nvPr/>
         </p:nvPicPr>
         <p:blipFill>
-          <a:blip r:embed="rId3"/>
+          <a:blip r:embed="rId4"/>
           <a:stretch>
             <a:fillRect/>
           </a:stretch>
@@ -15571,7 +16414,7 @@
           <p:nvPr/>
         </p:nvPicPr>
         <p:blipFill>
-          <a:blip r:embed="rId4"/>
+          <a:blip r:embed="rId5"/>
           <a:stretch>
             <a:fillRect/>
           </a:stretch>
@@ -15723,7 +16566,15 @@
             </a:r>
             <a:r>
               <a:rPr lang="fr-FR" dirty="0"/>
-              <a:t> crucial to automate as </a:t>
+              <a:t> crucial to automate </a:t>
+            </a:r>
+            <a:r>
+              <a:rPr lang="fr-FR" dirty="0" err="1"/>
+              <a:t>it</a:t>
+            </a:r>
+            <a:r>
+              <a:rPr lang="fr-FR" dirty="0"/>
+              <a:t> as </a:t>
             </a:r>
             <a:r>
               <a:rPr lang="fr-FR" dirty="0" err="1"/>

</xml_diff>

<commit_message>
update des readme avec une section contributions
</commit_message>
<xml_diff>
--- a/02_EDA/99_Project_Speed_Dating/01_speed_dating_project.pptx
+++ b/02_EDA/99_Project_Speed_Dating/01_speed_dating_project.pptx
@@ -9,8 +9,8 @@
   </p:notesMasterIdLst>
   <p:sldIdLst>
     <p:sldId id="256" r:id="rId2"/>
-    <p:sldId id="259" r:id="rId3"/>
-    <p:sldId id="258" r:id="rId4"/>
+    <p:sldId id="258" r:id="rId3"/>
+    <p:sldId id="259" r:id="rId4"/>
     <p:sldId id="261" r:id="rId5"/>
     <p:sldId id="266" r:id="rId6"/>
     <p:sldId id="268" r:id="rId7"/>
@@ -139,7 +139,7 @@
 <file path=ppt/revisionInfo.xml><?xml version="1.0" encoding="utf-8"?>
 <p1510:revInfo xmlns:a="http://schemas.openxmlformats.org/drawingml/2006/main" xmlns:r="http://schemas.openxmlformats.org/officeDocument/2006/relationships" xmlns:p1510="http://schemas.microsoft.com/office/powerpoint/2015/10/main">
   <p1510:revLst>
-    <p1510:client id="{B2EE689F-2065-402A-8908-926DEA39FEF1}" v="27" dt="2024-09-04T14:11:45.088"/>
+    <p1510:client id="{B2EE689F-2065-402A-8908-926DEA39FEF1}" v="39" dt="2024-09-05T06:01:23.642"/>
   </p1510:revLst>
 </p1510:revInfo>
 </file>
@@ -196,7 +196,7 @@
   <pc:docChgLst>
     <pc:chgData name="Philippe Baucour" userId="5102170ae7533958" providerId="LiveId" clId="{B2EE689F-2065-402A-8908-926DEA39FEF1}"/>
     <pc:docChg chg="undo custSel addSld delSld modSld sldOrd">
-      <pc:chgData name="Philippe Baucour" userId="5102170ae7533958" providerId="LiveId" clId="{B2EE689F-2065-402A-8908-926DEA39FEF1}" dt="2024-09-04T14:54:08.522" v="3545" actId="1076"/>
+      <pc:chgData name="Philippe Baucour" userId="5102170ae7533958" providerId="LiveId" clId="{B2EE689F-2065-402A-8908-926DEA39FEF1}" dt="2024-09-05T09:18:39.773" v="3715" actId="20577"/>
       <pc:docMkLst>
         <pc:docMk/>
       </pc:docMkLst>
@@ -224,13 +224,13 @@
         </pc:spChg>
       </pc:sldChg>
       <pc:sldChg chg="modSp mod modNotesTx">
-        <pc:chgData name="Philippe Baucour" userId="5102170ae7533958" providerId="LiveId" clId="{B2EE689F-2065-402A-8908-926DEA39FEF1}" dt="2024-09-04T14:13:33.722" v="3493" actId="20577"/>
+        <pc:chgData name="Philippe Baucour" userId="5102170ae7533958" providerId="LiveId" clId="{B2EE689F-2065-402A-8908-926DEA39FEF1}" dt="2024-09-05T09:18:39.773" v="3715" actId="20577"/>
         <pc:sldMkLst>
           <pc:docMk/>
           <pc:sldMk cId="3201622378" sldId="257"/>
         </pc:sldMkLst>
         <pc:spChg chg="mod">
-          <ac:chgData name="Philippe Baucour" userId="5102170ae7533958" providerId="LiveId" clId="{B2EE689F-2065-402A-8908-926DEA39FEF1}" dt="2024-09-04T14:11:21.046" v="3462" actId="20577"/>
+          <ac:chgData name="Philippe Baucour" userId="5102170ae7533958" providerId="LiveId" clId="{B2EE689F-2065-402A-8908-926DEA39FEF1}" dt="2024-09-05T09:18:39.773" v="3715" actId="20577"/>
           <ac:spMkLst>
             <pc:docMk/>
             <pc:sldMk cId="3201622378" sldId="257"/>
@@ -238,8 +238,8 @@
           </ac:spMkLst>
         </pc:spChg>
       </pc:sldChg>
-      <pc:sldChg chg="modSp add mod">
-        <pc:chgData name="Philippe Baucour" userId="5102170ae7533958" providerId="LiveId" clId="{B2EE689F-2065-402A-8908-926DEA39FEF1}" dt="2024-08-20T16:43:36.696" v="2422" actId="108"/>
+      <pc:sldChg chg="modSp add mod ord modShow">
+        <pc:chgData name="Philippe Baucour" userId="5102170ae7533958" providerId="LiveId" clId="{B2EE689F-2065-402A-8908-926DEA39FEF1}" dt="2024-09-05T05:46:17.355" v="3598"/>
         <pc:sldMkLst>
           <pc:docMk/>
           <pc:sldMk cId="246086491" sldId="258"/>
@@ -268,7 +268,7 @@
         </pc:sldMkLst>
       </pc:sldChg>
       <pc:sldChg chg="addSp delSp modSp new mod ord modClrScheme chgLayout modNotesTx">
-        <pc:chgData name="Philippe Baucour" userId="5102170ae7533958" providerId="LiveId" clId="{B2EE689F-2065-402A-8908-926DEA39FEF1}" dt="2024-08-26T09:51:38.387" v="2730" actId="20577"/>
+        <pc:chgData name="Philippe Baucour" userId="5102170ae7533958" providerId="LiveId" clId="{B2EE689F-2065-402A-8908-926DEA39FEF1}" dt="2024-09-05T05:53:14.058" v="3680" actId="14100"/>
         <pc:sldMkLst>
           <pc:docMk/>
           <pc:sldMk cId="3595025937" sldId="259"/>
@@ -295,6 +295,94 @@
             <pc:docMk/>
             <pc:sldMk cId="3595025937" sldId="259"/>
             <ac:spMk id="3" creationId="{F99D3141-1EEC-FB5F-4E02-E4226DD5CC31}"/>
+          </ac:spMkLst>
+        </pc:spChg>
+        <pc:spChg chg="add mod">
+          <ac:chgData name="Philippe Baucour" userId="5102170ae7533958" providerId="LiveId" clId="{B2EE689F-2065-402A-8908-926DEA39FEF1}" dt="2024-09-05T05:49:58.363" v="3638" actId="14100"/>
+          <ac:spMkLst>
+            <pc:docMk/>
+            <pc:sldMk cId="3595025937" sldId="259"/>
+            <ac:spMk id="4" creationId="{57D6FBB8-8A7C-DFEE-E53A-54F61A96336C}"/>
+          </ac:spMkLst>
+        </pc:spChg>
+        <pc:spChg chg="add mod">
+          <ac:chgData name="Philippe Baucour" userId="5102170ae7533958" providerId="LiveId" clId="{B2EE689F-2065-402A-8908-926DEA39FEF1}" dt="2024-09-05T05:50:11.514" v="3641" actId="14100"/>
+          <ac:spMkLst>
+            <pc:docMk/>
+            <pc:sldMk cId="3595025937" sldId="259"/>
+            <ac:spMk id="6" creationId="{6DFE76AE-2F65-78EB-1B24-8A0ABB505C30}"/>
+          </ac:spMkLst>
+        </pc:spChg>
+        <pc:spChg chg="add mod">
+          <ac:chgData name="Philippe Baucour" userId="5102170ae7533958" providerId="LiveId" clId="{B2EE689F-2065-402A-8908-926DEA39FEF1}" dt="2024-09-05T05:50:22.076" v="3644" actId="14100"/>
+          <ac:spMkLst>
+            <pc:docMk/>
+            <pc:sldMk cId="3595025937" sldId="259"/>
+            <ac:spMk id="7" creationId="{9448BFE7-B5D1-0F2D-3650-2EFB37548E4D}"/>
+          </ac:spMkLst>
+        </pc:spChg>
+        <pc:spChg chg="add mod">
+          <ac:chgData name="Philippe Baucour" userId="5102170ae7533958" providerId="LiveId" clId="{B2EE689F-2065-402A-8908-926DEA39FEF1}" dt="2024-09-05T05:50:36.837" v="3647" actId="14100"/>
+          <ac:spMkLst>
+            <pc:docMk/>
+            <pc:sldMk cId="3595025937" sldId="259"/>
+            <ac:spMk id="8" creationId="{552367B6-4E07-2E5B-998A-6EA418CA9C98}"/>
+          </ac:spMkLst>
+        </pc:spChg>
+        <pc:spChg chg="add mod">
+          <ac:chgData name="Philippe Baucour" userId="5102170ae7533958" providerId="LiveId" clId="{B2EE689F-2065-402A-8908-926DEA39FEF1}" dt="2024-09-05T05:50:59.588" v="3651" actId="1038"/>
+          <ac:spMkLst>
+            <pc:docMk/>
+            <pc:sldMk cId="3595025937" sldId="259"/>
+            <ac:spMk id="9" creationId="{B6223E86-142F-1586-FB8D-1DA87531DD52}"/>
+          </ac:spMkLst>
+        </pc:spChg>
+        <pc:spChg chg="add mod">
+          <ac:chgData name="Philippe Baucour" userId="5102170ae7533958" providerId="LiveId" clId="{B2EE689F-2065-402A-8908-926DEA39FEF1}" dt="2024-09-05T05:51:24.505" v="3658" actId="14100"/>
+          <ac:spMkLst>
+            <pc:docMk/>
+            <pc:sldMk cId="3595025937" sldId="259"/>
+            <ac:spMk id="10" creationId="{E07C8C13-6226-6B74-B92C-51947593BD15}"/>
+          </ac:spMkLst>
+        </pc:spChg>
+        <pc:spChg chg="add mod">
+          <ac:chgData name="Philippe Baucour" userId="5102170ae7533958" providerId="LiveId" clId="{B2EE689F-2065-402A-8908-926DEA39FEF1}" dt="2024-09-05T05:51:44.109" v="3661" actId="14100"/>
+          <ac:spMkLst>
+            <pc:docMk/>
+            <pc:sldMk cId="3595025937" sldId="259"/>
+            <ac:spMk id="11" creationId="{F714B8FD-3E46-34C9-CC4D-0E5F461AF571}"/>
+          </ac:spMkLst>
+        </pc:spChg>
+        <pc:spChg chg="add mod">
+          <ac:chgData name="Philippe Baucour" userId="5102170ae7533958" providerId="LiveId" clId="{B2EE689F-2065-402A-8908-926DEA39FEF1}" dt="2024-09-05T05:52:04.926" v="3664" actId="1035"/>
+          <ac:spMkLst>
+            <pc:docMk/>
+            <pc:sldMk cId="3595025937" sldId="259"/>
+            <ac:spMk id="12" creationId="{6D71338D-331C-5A8D-0BE2-18B158E54732}"/>
+          </ac:spMkLst>
+        </pc:spChg>
+        <pc:spChg chg="add mod">
+          <ac:chgData name="Philippe Baucour" userId="5102170ae7533958" providerId="LiveId" clId="{B2EE689F-2065-402A-8908-926DEA39FEF1}" dt="2024-09-05T05:52:24.808" v="3669" actId="1036"/>
+          <ac:spMkLst>
+            <pc:docMk/>
+            <pc:sldMk cId="3595025937" sldId="259"/>
+            <ac:spMk id="13" creationId="{C1A165F1-2083-18A9-30CB-6F447D695915}"/>
+          </ac:spMkLst>
+        </pc:spChg>
+        <pc:spChg chg="add mod">
+          <ac:chgData name="Philippe Baucour" userId="5102170ae7533958" providerId="LiveId" clId="{B2EE689F-2065-402A-8908-926DEA39FEF1}" dt="2024-09-05T05:52:41.276" v="3672" actId="14100"/>
+          <ac:spMkLst>
+            <pc:docMk/>
+            <pc:sldMk cId="3595025937" sldId="259"/>
+            <ac:spMk id="14" creationId="{2725DC78-6B38-B594-8745-33E4492EB206}"/>
+          </ac:spMkLst>
+        </pc:spChg>
+        <pc:spChg chg="add mod">
+          <ac:chgData name="Philippe Baucour" userId="5102170ae7533958" providerId="LiveId" clId="{B2EE689F-2065-402A-8908-926DEA39FEF1}" dt="2024-09-05T05:53:14.058" v="3680" actId="14100"/>
+          <ac:spMkLst>
+            <pc:docMk/>
+            <pc:sldMk cId="3595025937" sldId="259"/>
+            <ac:spMk id="15" creationId="{733BEA0B-A749-0B52-5567-71CED592B878}"/>
           </ac:spMkLst>
         </pc:spChg>
         <pc:picChg chg="add mod">
@@ -328,8 +416,8 @@
           </ac:spMkLst>
         </pc:spChg>
       </pc:sldChg>
-      <pc:sldChg chg="modSp add mod">
-        <pc:chgData name="Philippe Baucour" userId="5102170ae7533958" providerId="LiveId" clId="{B2EE689F-2065-402A-8908-926DEA39FEF1}" dt="2024-08-20T16:44:25.434" v="2428" actId="113"/>
+      <pc:sldChg chg="modSp add mod modShow">
+        <pc:chgData name="Philippe Baucour" userId="5102170ae7533958" providerId="LiveId" clId="{B2EE689F-2065-402A-8908-926DEA39FEF1}" dt="2024-09-05T05:54:21.610" v="3681" actId="729"/>
         <pc:sldMkLst>
           <pc:docMk/>
           <pc:sldMk cId="1735660937" sldId="261"/>
@@ -396,8 +484,8 @@
           <pc:sldMk cId="312535264" sldId="263"/>
         </pc:sldMkLst>
       </pc:sldChg>
-      <pc:sldChg chg="modSp add mod">
-        <pc:chgData name="Philippe Baucour" userId="5102170ae7533958" providerId="LiveId" clId="{B2EE689F-2065-402A-8908-926DEA39FEF1}" dt="2024-08-20T14:20:52.676" v="283" actId="20577"/>
+      <pc:sldChg chg="modSp add mod modShow">
+        <pc:chgData name="Philippe Baucour" userId="5102170ae7533958" providerId="LiveId" clId="{B2EE689F-2065-402A-8908-926DEA39FEF1}" dt="2024-09-05T05:44:30.235" v="3546" actId="729"/>
         <pc:sldMkLst>
           <pc:docMk/>
           <pc:sldMk cId="3032471110" sldId="264"/>
@@ -418,8 +506,8 @@
           <pc:sldMk cId="3631102099" sldId="265"/>
         </pc:sldMkLst>
       </pc:sldChg>
-      <pc:sldChg chg="addSp modSp add mod modNotesTx">
-        <pc:chgData name="Philippe Baucour" userId="5102170ae7533958" providerId="LiveId" clId="{B2EE689F-2065-402A-8908-926DEA39FEF1}" dt="2024-08-20T14:20:24.282" v="273" actId="14100"/>
+      <pc:sldChg chg="addSp modSp add mod modShow modNotesTx">
+        <pc:chgData name="Philippe Baucour" userId="5102170ae7533958" providerId="LiveId" clId="{B2EE689F-2065-402A-8908-926DEA39FEF1}" dt="2024-09-05T05:56:42.583" v="3682" actId="729"/>
         <pc:sldMkLst>
           <pc:docMk/>
           <pc:sldMk cId="747625521" sldId="266"/>
@@ -495,8 +583,8 @@
           </ac:picMkLst>
         </pc:picChg>
       </pc:sldChg>
-      <pc:sldChg chg="addSp delSp modSp new mod modClrScheme chgLayout">
-        <pc:chgData name="Philippe Baucour" userId="5102170ae7533958" providerId="LiveId" clId="{B2EE689F-2065-402A-8908-926DEA39FEF1}" dt="2024-08-20T15:04:27.183" v="881" actId="108"/>
+      <pc:sldChg chg="addSp delSp modSp new mod modClrScheme modShow chgLayout">
+        <pc:chgData name="Philippe Baucour" userId="5102170ae7533958" providerId="LiveId" clId="{B2EE689F-2065-402A-8908-926DEA39FEF1}" dt="2024-09-05T05:57:04.040" v="3683" actId="729"/>
         <pc:sldMkLst>
           <pc:docMk/>
           <pc:sldMk cId="1748231111" sldId="269"/>
@@ -542,7 +630,7 @@
           </ac:spMkLst>
         </pc:spChg>
         <pc:picChg chg="add mod">
-          <ac:chgData name="Philippe Baucour" userId="5102170ae7533958" providerId="LiveId" clId="{B2EE689F-2065-402A-8908-926DEA39FEF1}" dt="2024-08-20T15:04:23.102" v="877" actId="108"/>
+          <ac:chgData name="Philippe Baucour" userId="5102170ae7533958" providerId="LiveId" clId="{B2EE689F-2065-402A-8908-926DEA39FEF1}" dt="2024-09-05T05:46:54.527" v="3607" actId="1035"/>
           <ac:picMkLst>
             <pc:docMk/>
             <pc:sldMk cId="1748231111" sldId="269"/>
@@ -550,7 +638,7 @@
           </ac:picMkLst>
         </pc:picChg>
         <pc:picChg chg="add mod">
-          <ac:chgData name="Philippe Baucour" userId="5102170ae7533958" providerId="LiveId" clId="{B2EE689F-2065-402A-8908-926DEA39FEF1}" dt="2024-08-20T15:04:24.243" v="878" actId="108"/>
+          <ac:chgData name="Philippe Baucour" userId="5102170ae7533958" providerId="LiveId" clId="{B2EE689F-2065-402A-8908-926DEA39FEF1}" dt="2024-09-05T05:46:54.527" v="3607" actId="1035"/>
           <ac:picMkLst>
             <pc:docMk/>
             <pc:sldMk cId="1748231111" sldId="269"/>
@@ -590,8 +678,8 @@
           </ac:picMkLst>
         </pc:picChg>
       </pc:sldChg>
-      <pc:sldChg chg="modSp new mod modNotesTx">
-        <pc:chgData name="Philippe Baucour" userId="5102170ae7533958" providerId="LiveId" clId="{B2EE689F-2065-402A-8908-926DEA39FEF1}" dt="2024-09-04T07:17:24.977" v="3074" actId="20577"/>
+      <pc:sldChg chg="modSp new mod modShow modNotesTx">
+        <pc:chgData name="Philippe Baucour" userId="5102170ae7533958" providerId="LiveId" clId="{B2EE689F-2065-402A-8908-926DEA39FEF1}" dt="2024-09-05T05:57:38.022" v="3684" actId="729"/>
         <pc:sldMkLst>
           <pc:docMk/>
           <pc:sldMk cId="2492228979" sldId="270"/>
@@ -613,8 +701,8 @@
           </ac:spMkLst>
         </pc:spChg>
       </pc:sldChg>
-      <pc:sldChg chg="addSp delSp modSp new mod modClrScheme chgLayout modNotesTx">
-        <pc:chgData name="Philippe Baucour" userId="5102170ae7533958" providerId="LiveId" clId="{B2EE689F-2065-402A-8908-926DEA39FEF1}" dt="2024-09-04T07:26:34.670" v="3324" actId="6549"/>
+      <pc:sldChg chg="addSp delSp modSp new mod modClrScheme modShow chgLayout modNotesTx">
+        <pc:chgData name="Philippe Baucour" userId="5102170ae7533958" providerId="LiveId" clId="{B2EE689F-2065-402A-8908-926DEA39FEF1}" dt="2024-09-05T05:48:15.124" v="3608" actId="729"/>
         <pc:sldMkLst>
           <pc:docMk/>
           <pc:sldMk cId="1525589597" sldId="271"/>
@@ -740,13 +828,13 @@
         </pc:picChg>
       </pc:sldChg>
       <pc:sldChg chg="addSp modSp new mod">
-        <pc:chgData name="Philippe Baucour" userId="5102170ae7533958" providerId="LiveId" clId="{B2EE689F-2065-402A-8908-926DEA39FEF1}" dt="2024-08-20T16:47:48.114" v="2492" actId="1035"/>
+        <pc:chgData name="Philippe Baucour" userId="5102170ae7533958" providerId="LiveId" clId="{B2EE689F-2065-402A-8908-926DEA39FEF1}" dt="2024-09-05T05:45:33.185" v="3595" actId="20577"/>
         <pc:sldMkLst>
           <pc:docMk/>
           <pc:sldMk cId="84679321" sldId="273"/>
         </pc:sldMkLst>
         <pc:spChg chg="mod">
-          <ac:chgData name="Philippe Baucour" userId="5102170ae7533958" providerId="LiveId" clId="{B2EE689F-2065-402A-8908-926DEA39FEF1}" dt="2024-08-20T16:47:17.335" v="2452" actId="20577"/>
+          <ac:chgData name="Philippe Baucour" userId="5102170ae7533958" providerId="LiveId" clId="{B2EE689F-2065-402A-8908-926DEA39FEF1}" dt="2024-09-05T05:45:33.185" v="3595" actId="20577"/>
           <ac:spMkLst>
             <pc:docMk/>
             <pc:sldMk cId="84679321" sldId="273"/>
@@ -864,8 +952,8 @@
           </ac:picMkLst>
         </pc:picChg>
       </pc:sldChg>
-      <pc:sldChg chg="addSp delSp modSp new mod modClrScheme chgLayout">
-        <pc:chgData name="Philippe Baucour" userId="5102170ae7533958" providerId="LiveId" clId="{B2EE689F-2065-402A-8908-926DEA39FEF1}" dt="2024-08-20T16:49:57.237" v="2645" actId="700"/>
+      <pc:sldChg chg="addSp delSp modSp new mod modClrScheme chgLayout modNotesTx">
+        <pc:chgData name="Philippe Baucour" userId="5102170ae7533958" providerId="LiveId" clId="{B2EE689F-2065-402A-8908-926DEA39FEF1}" dt="2024-09-05T05:49:06.604" v="3631" actId="20577"/>
         <pc:sldMkLst>
           <pc:docMk/>
           <pc:sldMk cId="983044138" sldId="276"/>
@@ -928,7 +1016,7 @@
         </pc:picChg>
       </pc:sldChg>
       <pc:sldChg chg="addSp modSp new mod">
-        <pc:chgData name="Philippe Baucour" userId="5102170ae7533958" providerId="LiveId" clId="{B2EE689F-2065-402A-8908-926DEA39FEF1}" dt="2024-08-20T16:18:41.695" v="1623" actId="108"/>
+        <pc:chgData name="Philippe Baucour" userId="5102170ae7533958" providerId="LiveId" clId="{B2EE689F-2065-402A-8908-926DEA39FEF1}" dt="2024-09-05T06:01:40.550" v="3694" actId="1038"/>
         <pc:sldMkLst>
           <pc:docMk/>
           <pc:sldMk cId="3225795604" sldId="277"/>
@@ -939,6 +1027,14 @@
             <pc:docMk/>
             <pc:sldMk cId="3225795604" sldId="277"/>
             <ac:spMk id="2" creationId="{B9ACD412-2D77-0354-544C-6A39D7D093BB}"/>
+          </ac:spMkLst>
+        </pc:spChg>
+        <pc:spChg chg="add mod">
+          <ac:chgData name="Philippe Baucour" userId="5102170ae7533958" providerId="LiveId" clId="{B2EE689F-2065-402A-8908-926DEA39FEF1}" dt="2024-09-05T06:01:40.550" v="3694" actId="1038"/>
+          <ac:spMkLst>
+            <pc:docMk/>
+            <pc:sldMk cId="3225795604" sldId="277"/>
+            <ac:spMk id="4" creationId="{1E0AF798-DB41-EAAF-F330-05EFD1A7978D}"/>
           </ac:spMkLst>
         </pc:spChg>
         <pc:spChg chg="add mod">
@@ -990,8 +1086,8 @@
           </ac:picMkLst>
         </pc:picChg>
       </pc:sldChg>
-      <pc:sldChg chg="addSp modSp new mod modNotesTx">
-        <pc:chgData name="Philippe Baucour" userId="5102170ae7533958" providerId="LiveId" clId="{B2EE689F-2065-402A-8908-926DEA39FEF1}" dt="2024-08-20T16:37:26.001" v="2098" actId="20577"/>
+      <pc:sldChg chg="addSp modSp new mod modShow modNotesTx">
+        <pc:chgData name="Philippe Baucour" userId="5102170ae7533958" providerId="LiveId" clId="{B2EE689F-2065-402A-8908-926DEA39FEF1}" dt="2024-09-05T06:03:11.202" v="3695" actId="729"/>
         <pc:sldMkLst>
           <pc:docMk/>
           <pc:sldMk cId="694977292" sldId="278"/>
@@ -7848,7 +7944,7 @@
           <a:p>
             <a:fld id="{FD1752CD-A7D2-4825-BC26-9DAEFBD0A5FF}" type="datetimeFigureOut">
               <a:rPr lang="fr-FR" smtClean="0"/>
-              <a:t>04/09/2024</a:t>
+              <a:t>05/09/2024</a:t>
             </a:fld>
             <a:endParaRPr lang="fr-FR"/>
           </a:p>
@@ -8571,7 +8667,7 @@
           <a:p>
             <a:fld id="{341AEC00-4977-4C47-A11B-52155DC12F54}" type="slidenum">
               <a:rPr lang="fr-FR" smtClean="0"/>
-              <a:t>2</a:t>
+              <a:t>3</a:t>
             </a:fld>
             <a:endParaRPr lang="fr-FR"/>
           </a:p>
@@ -9395,33 +9491,8 @@
           <a:p>
             <a:r>
               <a:rPr lang="fr-FR" dirty="0"/>
-              <a:t>Z! Population de "</a:t>
-            </a:r>
-            <a:r>
-              <a:rPr lang="fr-FR" dirty="0" err="1"/>
-              <a:t>students</a:t>
-            </a:r>
-            <a:r>
-              <a:rPr lang="fr-FR" dirty="0"/>
-              <a:t>" (cf. le doc) </a:t>
-            </a:r>
-          </a:p>
-          <a:p>
-            <a:pPr lvl="1"/>
-            <a:r>
-              <a:rPr lang="fr-FR" dirty="0"/>
-              <a:t>pas des travailleurs en situation</a:t>
-            </a:r>
-          </a:p>
-          <a:p>
-            <a:pPr lvl="1"/>
-            <a:r>
-              <a:rPr lang="fr-FR" dirty="0"/>
-              <a:t>Est-ce que c'est la majorité des clients de Tinder ?</a:t>
-            </a:r>
-          </a:p>
-          <a:p>
-            <a:endParaRPr lang="fr-FR" dirty="0"/>
+              <a:t>551 unique participants</a:t>
+            </a:r>
           </a:p>
         </p:txBody>
       </p:sp>
@@ -9442,7 +9513,7 @@
           <a:p>
             <a:fld id="{341AEC00-4977-4C47-A11B-52155DC12F54}" type="slidenum">
               <a:rPr lang="fr-FR" smtClean="0"/>
-              <a:t>19</a:t>
+              <a:t>16</a:t>
             </a:fld>
             <a:endParaRPr lang="fr-FR"/>
           </a:p>
@@ -9451,7 +9522,7 @@
     </p:spTree>
     <p:extLst>
       <p:ext uri="{BB962C8B-B14F-4D97-AF65-F5344CB8AC3E}">
-        <p14:creationId xmlns:p14="http://schemas.microsoft.com/office/powerpoint/2010/main" val="509833682"/>
+        <p14:creationId xmlns:p14="http://schemas.microsoft.com/office/powerpoint/2010/main" val="2809883958"/>
       </p:ext>
     </p:extLst>
   </p:cSld>
@@ -9507,34 +9578,32 @@
           <a:p>
             <a:r>
               <a:rPr lang="fr-FR" dirty="0"/>
-              <a:t>Q1 : la confiance n'interdit pas le contrôle </a:t>
-            </a:r>
-            <a:r>
-              <a:rPr lang="fr-FR" dirty="0">
-                <a:sym typeface="Wingdings" panose="05000000000000000000" pitchFamily="2" charset="2"/>
-              </a:rPr>
-              <a:t></a:t>
-            </a:r>
-          </a:p>
-          <a:p>
-            <a:r>
-              <a:rPr lang="fr-FR" dirty="0">
-                <a:sym typeface="Wingdings" panose="05000000000000000000" pitchFamily="2" charset="2"/>
-              </a:rPr>
-              <a:t>Suffit de faire une pivot table sur le dataset en regardant sur l'ensemble des "matches" ceux où les participants repérés par leur </a:t>
-            </a:r>
-            <a:r>
-              <a:rPr lang="fr-FR" dirty="0" err="1">
-                <a:sym typeface="Wingdings" panose="05000000000000000000" pitchFamily="2" charset="2"/>
-              </a:rPr>
-              <a:t>user_id</a:t>
-            </a:r>
-            <a:r>
-              <a:rPr lang="fr-FR" dirty="0">
-                <a:sym typeface="Wingdings" panose="05000000000000000000" pitchFamily="2" charset="2"/>
-              </a:rPr>
-              <a:t> avaient la même race ou pas</a:t>
-            </a:r>
+              <a:t>Z! Population de "</a:t>
+            </a:r>
+            <a:r>
+              <a:rPr lang="fr-FR" dirty="0" err="1"/>
+              <a:t>students</a:t>
+            </a:r>
+            <a:r>
+              <a:rPr lang="fr-FR" dirty="0"/>
+              <a:t>" (cf. le doc) </a:t>
+            </a:r>
+          </a:p>
+          <a:p>
+            <a:pPr lvl="1"/>
+            <a:r>
+              <a:rPr lang="fr-FR" dirty="0"/>
+              <a:t>pas des travailleurs en situation</a:t>
+            </a:r>
+          </a:p>
+          <a:p>
+            <a:pPr lvl="1"/>
+            <a:r>
+              <a:rPr lang="fr-FR" dirty="0"/>
+              <a:t>Est-ce que c'est la majorité des clients de Tinder ?</a:t>
+            </a:r>
+          </a:p>
+          <a:p>
             <a:endParaRPr lang="fr-FR" dirty="0"/>
           </a:p>
         </p:txBody>
@@ -9556,6 +9625,120 @@
           <a:p>
             <a:fld id="{341AEC00-4977-4C47-A11B-52155DC12F54}" type="slidenum">
               <a:rPr lang="fr-FR" smtClean="0"/>
+              <a:t>19</a:t>
+            </a:fld>
+            <a:endParaRPr lang="fr-FR"/>
+          </a:p>
+        </p:txBody>
+      </p:sp>
+    </p:spTree>
+    <p:extLst>
+      <p:ext uri="{BB962C8B-B14F-4D97-AF65-F5344CB8AC3E}">
+        <p14:creationId xmlns:p14="http://schemas.microsoft.com/office/powerpoint/2010/main" val="509833682"/>
+      </p:ext>
+    </p:extLst>
+  </p:cSld>
+  <p:clrMapOvr>
+    <a:masterClrMapping/>
+  </p:clrMapOvr>
+</p:notes>
+</file>
+
+<file path=ppt/notesSlides/notesSlide8.xml><?xml version="1.0" encoding="utf-8"?>
+<p:notes xmlns:a="http://schemas.openxmlformats.org/drawingml/2006/main" xmlns:r="http://schemas.openxmlformats.org/officeDocument/2006/relationships" xmlns:p="http://schemas.openxmlformats.org/presentationml/2006/main">
+  <p:cSld>
+    <p:spTree>
+      <p:nvGrpSpPr>
+        <p:cNvPr id="1" name=""/>
+        <p:cNvGrpSpPr/>
+        <p:nvPr/>
+      </p:nvGrpSpPr>
+      <p:grpSpPr>
+        <a:xfrm>
+          <a:off x="0" y="0"/>
+          <a:ext cx="0" cy="0"/>
+          <a:chOff x="0" y="0"/>
+          <a:chExt cx="0" cy="0"/>
+        </a:xfrm>
+      </p:grpSpPr>
+      <p:sp>
+        <p:nvSpPr>
+          <p:cNvPr id="2" name="Espace réservé de l'image des diapositives 1"/>
+          <p:cNvSpPr>
+            <a:spLocks noGrp="1" noRot="1" noChangeAspect="1"/>
+          </p:cNvSpPr>
+          <p:nvPr>
+            <p:ph type="sldImg"/>
+          </p:nvPr>
+        </p:nvSpPr>
+        <p:spPr/>
+      </p:sp>
+      <p:sp>
+        <p:nvSpPr>
+          <p:cNvPr id="3" name="Espace réservé des notes 2"/>
+          <p:cNvSpPr>
+            <a:spLocks noGrp="1"/>
+          </p:cNvSpPr>
+          <p:nvPr>
+            <p:ph type="body" idx="1"/>
+          </p:nvPr>
+        </p:nvSpPr>
+        <p:spPr/>
+        <p:txBody>
+          <a:bodyPr/>
+          <a:lstStyle/>
+          <a:p>
+            <a:r>
+              <a:rPr lang="fr-FR" dirty="0"/>
+              <a:t>Q1 : la confiance n'interdit pas le contrôle </a:t>
+            </a:r>
+            <a:r>
+              <a:rPr lang="fr-FR" dirty="0">
+                <a:sym typeface="Wingdings" panose="05000000000000000000" pitchFamily="2" charset="2"/>
+              </a:rPr>
+              <a:t></a:t>
+            </a:r>
+          </a:p>
+          <a:p>
+            <a:r>
+              <a:rPr lang="fr-FR" dirty="0">
+                <a:sym typeface="Wingdings" panose="05000000000000000000" pitchFamily="2" charset="2"/>
+              </a:rPr>
+              <a:t>Suffit de faire une pivot table sur le dataset en regardant sur l'ensemble des "matches" ceux où les participants repérés par leur </a:t>
+            </a:r>
+            <a:r>
+              <a:rPr lang="fr-FR" dirty="0" err="1">
+                <a:sym typeface="Wingdings" panose="05000000000000000000" pitchFamily="2" charset="2"/>
+              </a:rPr>
+              <a:t>user_id</a:t>
+            </a:r>
+            <a:r>
+              <a:rPr lang="fr-FR" dirty="0">
+                <a:sym typeface="Wingdings" panose="05000000000000000000" pitchFamily="2" charset="2"/>
+              </a:rPr>
+              <a:t> avaient la même race ou pas</a:t>
+            </a:r>
+            <a:endParaRPr lang="fr-FR" dirty="0"/>
+          </a:p>
+        </p:txBody>
+      </p:sp>
+      <p:sp>
+        <p:nvSpPr>
+          <p:cNvPr id="4" name="Espace réservé du numéro de diapositive 3"/>
+          <p:cNvSpPr>
+            <a:spLocks noGrp="1"/>
+          </p:cNvSpPr>
+          <p:nvPr>
+            <p:ph type="sldNum" sz="quarter" idx="5"/>
+          </p:nvPr>
+        </p:nvSpPr>
+        <p:spPr/>
+        <p:txBody>
+          <a:bodyPr/>
+          <a:lstStyle/>
+          <a:p>
+            <a:fld id="{341AEC00-4977-4C47-A11B-52155DC12F54}" type="slidenum">
+              <a:rPr lang="fr-FR" smtClean="0"/>
               <a:t>20</a:t>
             </a:fld>
             <a:endParaRPr lang="fr-FR"/>
@@ -9575,7 +9758,7 @@
 </p:notes>
 </file>
 
-<file path=ppt/notesSlides/notesSlide8.xml><?xml version="1.0" encoding="utf-8"?>
+<file path=ppt/notesSlides/notesSlide9.xml><?xml version="1.0" encoding="utf-8"?>
 <p:notes xmlns:a="http://schemas.openxmlformats.org/drawingml/2006/main" xmlns:r="http://schemas.openxmlformats.org/officeDocument/2006/relationships" xmlns:p="http://schemas.openxmlformats.org/presentationml/2006/main">
   <p:cSld>
     <p:spTree>
@@ -9860,7 +10043,7 @@
           <a:p>
             <a:fld id="{7ECB9D5A-E5E4-41FE-AF39-634902D6D5D2}" type="datetimeFigureOut">
               <a:rPr lang="fr-FR" smtClean="0"/>
-              <a:t>04/09/2024</a:t>
+              <a:t>05/09/2024</a:t>
             </a:fld>
             <a:endParaRPr lang="fr-FR"/>
           </a:p>
@@ -10058,7 +10241,7 @@
           <a:p>
             <a:fld id="{7ECB9D5A-E5E4-41FE-AF39-634902D6D5D2}" type="datetimeFigureOut">
               <a:rPr lang="fr-FR" smtClean="0"/>
-              <a:t>04/09/2024</a:t>
+              <a:t>05/09/2024</a:t>
             </a:fld>
             <a:endParaRPr lang="fr-FR"/>
           </a:p>
@@ -10266,7 +10449,7 @@
           <a:p>
             <a:fld id="{7ECB9D5A-E5E4-41FE-AF39-634902D6D5D2}" type="datetimeFigureOut">
               <a:rPr lang="fr-FR" smtClean="0"/>
-              <a:t>04/09/2024</a:t>
+              <a:t>05/09/2024</a:t>
             </a:fld>
             <a:endParaRPr lang="fr-FR"/>
           </a:p>
@@ -10426,7 +10609,7 @@
           </a:ln>
           <a:extLst>
             <a:ext uri="{C572A759-6A51-4108-AA02-DFA0A04FC94B}">
-              <ma14:wrappingTextBoxFlag xmlns:ma14="http://schemas.microsoft.com/office/mac/drawingml/2011/main" xmlns="" val="1"/>
+              <ma14:wrappingTextBoxFlag xmlns="" xmlns:ma14="http://schemas.microsoft.com/office/mac/drawingml/2011/main" val="1"/>
             </a:ext>
           </a:extLst>
         </p:spPr>
@@ -10683,7 +10866,7 @@
           <a:p>
             <a:fld id="{7ECB9D5A-E5E4-41FE-AF39-634902D6D5D2}" type="datetimeFigureOut">
               <a:rPr lang="fr-FR" smtClean="0"/>
-              <a:t>04/09/2024</a:t>
+              <a:t>05/09/2024</a:t>
             </a:fld>
             <a:endParaRPr lang="fr-FR"/>
           </a:p>
@@ -10958,7 +11141,7 @@
           <a:p>
             <a:fld id="{7ECB9D5A-E5E4-41FE-AF39-634902D6D5D2}" type="datetimeFigureOut">
               <a:rPr lang="fr-FR" smtClean="0"/>
-              <a:t>04/09/2024</a:t>
+              <a:t>05/09/2024</a:t>
             </a:fld>
             <a:endParaRPr lang="fr-FR"/>
           </a:p>
@@ -11223,7 +11406,7 @@
           <a:p>
             <a:fld id="{7ECB9D5A-E5E4-41FE-AF39-634902D6D5D2}" type="datetimeFigureOut">
               <a:rPr lang="fr-FR" smtClean="0"/>
-              <a:t>04/09/2024</a:t>
+              <a:t>05/09/2024</a:t>
             </a:fld>
             <a:endParaRPr lang="fr-FR"/>
           </a:p>
@@ -11635,7 +11818,7 @@
           <a:p>
             <a:fld id="{7ECB9D5A-E5E4-41FE-AF39-634902D6D5D2}" type="datetimeFigureOut">
               <a:rPr lang="fr-FR" smtClean="0"/>
-              <a:t>04/09/2024</a:t>
+              <a:t>05/09/2024</a:t>
             </a:fld>
             <a:endParaRPr lang="fr-FR"/>
           </a:p>
@@ -11776,7 +11959,7 @@
           <a:p>
             <a:fld id="{7ECB9D5A-E5E4-41FE-AF39-634902D6D5D2}" type="datetimeFigureOut">
               <a:rPr lang="fr-FR" smtClean="0"/>
-              <a:t>04/09/2024</a:t>
+              <a:t>05/09/2024</a:t>
             </a:fld>
             <a:endParaRPr lang="fr-FR"/>
           </a:p>
@@ -11889,7 +12072,7 @@
           <a:p>
             <a:fld id="{7ECB9D5A-E5E4-41FE-AF39-634902D6D5D2}" type="datetimeFigureOut">
               <a:rPr lang="fr-FR" smtClean="0"/>
-              <a:t>04/09/2024</a:t>
+              <a:t>05/09/2024</a:t>
             </a:fld>
             <a:endParaRPr lang="fr-FR"/>
           </a:p>
@@ -12200,7 +12383,7 @@
           <a:p>
             <a:fld id="{7ECB9D5A-E5E4-41FE-AF39-634902D6D5D2}" type="datetimeFigureOut">
               <a:rPr lang="fr-FR" smtClean="0"/>
-              <a:t>04/09/2024</a:t>
+              <a:t>05/09/2024</a:t>
             </a:fld>
             <a:endParaRPr lang="fr-FR"/>
           </a:p>
@@ -12491,7 +12674,7 @@
           <a:p>
             <a:fld id="{7ECB9D5A-E5E4-41FE-AF39-634902D6D5D2}" type="datetimeFigureOut">
               <a:rPr lang="fr-FR" smtClean="0"/>
-              <a:t>04/09/2024</a:t>
+              <a:t>05/09/2024</a:t>
             </a:fld>
             <a:endParaRPr lang="fr-FR"/>
           </a:p>
@@ -12732,7 +12915,7 @@
           <a:p>
             <a:fld id="{7ECB9D5A-E5E4-41FE-AF39-634902D6D5D2}" type="datetimeFigureOut">
               <a:rPr lang="fr-FR" smtClean="0"/>
-              <a:t>04/09/2024</a:t>
+              <a:t>05/09/2024</a:t>
             </a:fld>
             <a:endParaRPr lang="fr-FR"/>
           </a:p>
@@ -13291,7 +13474,7 @@
 </file>
 
 <file path=ppt/slides/slide10.xml><?xml version="1.0" encoding="utf-8"?>
-<p:sld xmlns:a="http://schemas.openxmlformats.org/drawingml/2006/main" xmlns:r="http://schemas.openxmlformats.org/officeDocument/2006/relationships" xmlns:p="http://schemas.openxmlformats.org/presentationml/2006/main">
+<p:sld xmlns:a="http://schemas.openxmlformats.org/drawingml/2006/main" xmlns:r="http://schemas.openxmlformats.org/officeDocument/2006/relationships" xmlns:p="http://schemas.openxmlformats.org/presentationml/2006/main" show="0">
   <p:cSld>
     <p:spTree>
       <p:nvGrpSpPr>
@@ -13361,7 +13544,7 @@
         </p:blipFill>
         <p:spPr>
           <a:xfrm>
-            <a:off x="2770824" y="863833"/>
+            <a:off x="2770824" y="969341"/>
             <a:ext cx="3058478" cy="797233"/>
           </a:xfrm>
           <a:prstGeom prst="rect">
@@ -13398,7 +13581,7 @@
         </p:blipFill>
         <p:spPr>
           <a:xfrm>
-            <a:off x="7745949" y="863833"/>
+            <a:off x="7745949" y="969341"/>
             <a:ext cx="1522571" cy="1045452"/>
           </a:xfrm>
           <a:prstGeom prst="rect">
@@ -13753,16 +13936,20 @@
           <a:lstStyle/>
           <a:p>
             <a:r>
+              <a:rPr lang="fr-FR" dirty="0" err="1"/>
+              <a:t>Result</a:t>
+            </a:r>
+            <a:r>
               <a:rPr lang="fr-FR" dirty="0"/>
-              <a:t>2 </a:t>
+              <a:t> </a:t>
             </a:r>
             <a:r>
               <a:rPr lang="fr-FR" dirty="0" err="1"/>
-              <a:t>words</a:t>
+              <a:t>from</a:t>
             </a:r>
             <a:r>
               <a:rPr lang="fr-FR" dirty="0"/>
-              <a:t> about the </a:t>
+              <a:t> </a:t>
             </a:r>
             <a:r>
               <a:rPr lang="fr-FR" dirty="0" err="1"/>
@@ -13770,13 +13957,8 @@
             </a:r>
             <a:r>
               <a:rPr lang="fr-FR" dirty="0"/>
-              <a:t>() </a:t>
-            </a:r>
-            <a:r>
-              <a:rPr lang="fr-FR" dirty="0" err="1"/>
-              <a:t>function</a:t>
-            </a:r>
-            <a:endParaRPr lang="fr-FR" dirty="0"/>
+              <a:t>()</a:t>
+            </a:r>
           </a:p>
         </p:txBody>
       </p:sp>
@@ -14147,7 +14329,7 @@
 </file>
 
 <file path=ppt/slides/slide13.xml><?xml version="1.0" encoding="utf-8"?>
-<p:sld xmlns:a="http://schemas.openxmlformats.org/drawingml/2006/main" xmlns:r="http://schemas.openxmlformats.org/officeDocument/2006/relationships" xmlns:p="http://schemas.openxmlformats.org/presentationml/2006/main">
+<p:sld xmlns:a="http://schemas.openxmlformats.org/drawingml/2006/main" xmlns:r="http://schemas.openxmlformats.org/officeDocument/2006/relationships" xmlns:p="http://schemas.openxmlformats.org/presentationml/2006/main" show="0">
   <p:cSld>
     <p:spTree>
       <p:nvGrpSpPr>
@@ -14510,7 +14692,7 @@
 </file>
 
 <file path=ppt/slides/slide15.xml><?xml version="1.0" encoding="utf-8"?>
-<p:sld xmlns:a="http://schemas.openxmlformats.org/drawingml/2006/main" xmlns:r="http://schemas.openxmlformats.org/officeDocument/2006/relationships" xmlns:p="http://schemas.openxmlformats.org/presentationml/2006/main">
+<p:sld xmlns:a="http://schemas.openxmlformats.org/drawingml/2006/main" xmlns:r="http://schemas.openxmlformats.org/officeDocument/2006/relationships" xmlns:p="http://schemas.openxmlformats.org/presentationml/2006/main" show="0">
   <p:cSld>
     <p:spTree>
       <p:nvGrpSpPr>
@@ -14742,7 +14924,7 @@
           <p:nvPr/>
         </p:nvPicPr>
         <p:blipFill>
-          <a:blip r:embed="rId2"/>
+          <a:blip r:embed="rId3"/>
           <a:stretch>
             <a:fillRect/>
           </a:stretch>
@@ -14772,7 +14954,7 @@
           <p:nvPr/>
         </p:nvPicPr>
         <p:blipFill>
-          <a:blip r:embed="rId3"/>
+          <a:blip r:embed="rId4"/>
           <a:stretch>
             <a:fillRect/>
           </a:stretch>
@@ -14802,7 +14984,7 @@
           <p:nvPr/>
         </p:nvPicPr>
         <p:blipFill>
-          <a:blip r:embed="rId4"/>
+          <a:blip r:embed="rId5"/>
           <a:stretch>
             <a:fillRect/>
           </a:stretch>
@@ -14832,7 +15014,7 @@
           <p:nvPr/>
         </p:nvPicPr>
         <p:blipFill>
-          <a:blip r:embed="rId5"/>
+          <a:blip r:embed="rId6"/>
           <a:stretch>
             <a:fillRect/>
           </a:stretch>
@@ -15208,6 +15390,60 @@
           </a:p>
         </p:txBody>
       </p:sp>
+      <p:sp>
+        <p:nvSpPr>
+          <p:cNvPr id="4" name="Rectangle 3">
+            <a:extLst>
+              <a:ext uri="{FF2B5EF4-FFF2-40B4-BE49-F238E27FC236}">
+                <a16:creationId xmlns:a16="http://schemas.microsoft.com/office/drawing/2014/main" id="{1E0AF798-DB41-EAAF-F330-05EFD1A7978D}"/>
+              </a:ext>
+            </a:extLst>
+          </p:cNvPr>
+          <p:cNvSpPr/>
+          <p:nvPr/>
+        </p:nvSpPr>
+        <p:spPr>
+          <a:xfrm>
+            <a:off x="625994" y="4363103"/>
+            <a:ext cx="677573" cy="212432"/>
+          </a:xfrm>
+          <a:prstGeom prst="rect">
+            <a:avLst/>
+          </a:prstGeom>
+          <a:solidFill>
+            <a:srgbClr val="FF0000">
+              <a:alpha val="50000"/>
+            </a:srgbClr>
+          </a:solidFill>
+          <a:ln>
+            <a:noFill/>
+          </a:ln>
+        </p:spPr>
+        <p:style>
+          <a:lnRef idx="2">
+            <a:schemeClr val="accent1">
+              <a:shade val="15000"/>
+            </a:schemeClr>
+          </a:lnRef>
+          <a:fillRef idx="1">
+            <a:schemeClr val="accent1"/>
+          </a:fillRef>
+          <a:effectRef idx="0">
+            <a:schemeClr val="accent1"/>
+          </a:effectRef>
+          <a:fontRef idx="minor">
+            <a:schemeClr val="lt1"/>
+          </a:fontRef>
+        </p:style>
+        <p:txBody>
+          <a:bodyPr rtlCol="0" anchor="ctr"/>
+          <a:lstStyle/>
+          <a:p>
+            <a:pPr algn="ctr"/>
+            <a:endParaRPr lang="fr-FR"/>
+          </a:p>
+        </p:txBody>
+      </p:sp>
     </p:spTree>
     <p:extLst>
       <p:ext uri="{BB962C8B-B14F-4D97-AF65-F5344CB8AC3E}">
@@ -15674,7 +15910,7 @@
 </file>
 
 <file path=ppt/slides/slide19.xml><?xml version="1.0" encoding="utf-8"?>
-<p:sld xmlns:a="http://schemas.openxmlformats.org/drawingml/2006/main" xmlns:r="http://schemas.openxmlformats.org/officeDocument/2006/relationships" xmlns:p="http://schemas.openxmlformats.org/presentationml/2006/main">
+<p:sld xmlns:a="http://schemas.openxmlformats.org/drawingml/2006/main" xmlns:r="http://schemas.openxmlformats.org/officeDocument/2006/relationships" xmlns:p="http://schemas.openxmlformats.org/presentationml/2006/main" show="0">
   <p:cSld>
     <p:spTree>
       <p:nvGrpSpPr>
@@ -15984,7 +16220,7 @@
 </file>
 
 <file path=ppt/slides/slide2.xml><?xml version="1.0" encoding="utf-8"?>
-<p:sld xmlns:a="http://schemas.openxmlformats.org/drawingml/2006/main" xmlns:r="http://schemas.openxmlformats.org/officeDocument/2006/relationships" xmlns:p="http://schemas.openxmlformats.org/presentationml/2006/main">
+<p:sld xmlns:a="http://schemas.openxmlformats.org/drawingml/2006/main" xmlns:r="http://schemas.openxmlformats.org/officeDocument/2006/relationships" xmlns:p="http://schemas.openxmlformats.org/presentationml/2006/main" show="0">
   <p:cSld>
     <p:spTree>
       <p:nvGrpSpPr>
@@ -16005,7 +16241,7 @@
           <p:cNvPr id="2" name="Titre 1">
             <a:extLst>
               <a:ext uri="{FF2B5EF4-FFF2-40B4-BE49-F238E27FC236}">
-                <a16:creationId xmlns:a16="http://schemas.microsoft.com/office/drawing/2014/main" id="{9401C507-3D1F-23F1-FC25-F88A14E5D2D2}"/>
+                <a16:creationId xmlns:a16="http://schemas.microsoft.com/office/drawing/2014/main" id="{0973683F-97F4-B09A-A1A0-F35F30E7220F}"/>
               </a:ext>
             </a:extLst>
           </p:cNvPr>
@@ -16023,98 +16259,82 @@
           <a:p>
             <a:r>
               <a:rPr lang="fr-FR" dirty="0" err="1"/>
-              <a:t>Executive</a:t>
-            </a:r>
-            <a:r>
-              <a:rPr lang="fr-FR" dirty="0"/>
-              <a:t> </a:t>
-            </a:r>
-            <a:r>
-              <a:rPr lang="fr-FR" dirty="0" err="1"/>
-              <a:t>Summary</a:t>
+              <a:t>Specifications</a:t>
             </a:r>
             <a:endParaRPr lang="fr-FR" dirty="0"/>
           </a:p>
         </p:txBody>
       </p:sp>
-      <p:pic>
-        <p:nvPicPr>
-          <p:cNvPr id="5" name="Image 4">
-            <a:extLst>
-              <a:ext uri="{FF2B5EF4-FFF2-40B4-BE49-F238E27FC236}">
-                <a16:creationId xmlns:a16="http://schemas.microsoft.com/office/drawing/2014/main" id="{2B92A725-ABA1-9076-A45D-26AB83219752}"/>
-              </a:ext>
-            </a:extLst>
-          </p:cNvPr>
-          <p:cNvPicPr>
-            <a:picLocks noChangeAspect="1"/>
-          </p:cNvPicPr>
-          <p:nvPr/>
-        </p:nvPicPr>
-        <p:blipFill>
-          <a:blip r:embed="rId3"/>
-          <a:stretch>
-            <a:fillRect/>
-          </a:stretch>
-        </p:blipFill>
-        <p:spPr>
-          <a:xfrm rot="21387705">
-            <a:off x="367277" y="863593"/>
-            <a:ext cx="11283991" cy="4844284"/>
-          </a:xfrm>
-          <a:prstGeom prst="rect">
-            <a:avLst/>
-          </a:prstGeom>
-          <a:effectLst>
-            <a:outerShdw blurRad="50800" dist="38100" dir="2700000" algn="tl" rotWithShape="0">
-              <a:prstClr val="black">
-                <a:alpha val="40000"/>
-              </a:prstClr>
-            </a:outerShdw>
-          </a:effectLst>
-        </p:spPr>
-      </p:pic>
       <p:sp>
         <p:nvSpPr>
-          <p:cNvPr id="3" name="ZoneTexte 2">
+          <p:cNvPr id="3" name="Espace réservé du contenu 2">
             <a:extLst>
               <a:ext uri="{FF2B5EF4-FFF2-40B4-BE49-F238E27FC236}">
-                <a16:creationId xmlns:a16="http://schemas.microsoft.com/office/drawing/2014/main" id="{DAA69606-7991-E7A7-6DA7-C10E2197153D}"/>
+                <a16:creationId xmlns:a16="http://schemas.microsoft.com/office/drawing/2014/main" id="{A88399CA-BBD6-ECCC-534E-0335C54116C3}"/>
               </a:ext>
             </a:extLst>
           </p:cNvPr>
-          <p:cNvSpPr txBox="1"/>
-          <p:nvPr/>
+          <p:cNvSpPr>
+            <a:spLocks noGrp="1"/>
+          </p:cNvSpPr>
+          <p:nvPr>
+            <p:ph idx="1"/>
+          </p:nvPr>
         </p:nvSpPr>
-        <p:spPr>
-          <a:xfrm rot="21345198">
-            <a:off x="9618495" y="5403420"/>
-            <a:ext cx="2151551" cy="307777"/>
-          </a:xfrm>
-          <a:prstGeom prst="rect">
-            <a:avLst/>
-          </a:prstGeom>
-          <a:noFill/>
-        </p:spPr>
+        <p:spPr/>
         <p:txBody>
-          <a:bodyPr wrap="none" rtlCol="0">
-            <a:spAutoFit/>
+          <a:bodyPr>
+            <a:normAutofit/>
           </a:bodyPr>
           <a:lstStyle/>
           <a:p>
             <a:r>
-              <a:rPr lang="fr-FR" sz="1400" i="1" dirty="0" err="1">
-                <a:latin typeface="Times New Roman" panose="02020603050405020304" pitchFamily="18" charset="0"/>
-                <a:cs typeface="Times New Roman" panose="02020603050405020304" pitchFamily="18" charset="0"/>
+              <a:rPr lang="en-US" dirty="0"/>
+              <a:t>Tinder is experiencing a </a:t>
+            </a:r>
+            <a:r>
+              <a:rPr lang="en-US" dirty="0">
+                <a:highlight>
+                  <a:srgbClr val="FFFF00"/>
+                </a:highlight>
               </a:rPr>
-              <a:t>See</a:t>
-            </a:r>
-            <a:r>
-              <a:rPr lang="fr-FR" sz="1400" i="1" dirty="0">
-                <a:latin typeface="Times New Roman" panose="02020603050405020304" pitchFamily="18" charset="0"/>
-                <a:cs typeface="Times New Roman" panose="02020603050405020304" pitchFamily="18" charset="0"/>
+              <a:t>decrease</a:t>
+            </a:r>
+            <a:r>
+              <a:rPr lang="en-US" dirty="0"/>
+              <a:t> in the number of </a:t>
+            </a:r>
+            <a:r>
+              <a:rPr lang="en-US" dirty="0">
+                <a:highlight>
+                  <a:srgbClr val="FFFF00"/>
+                </a:highlight>
               </a:rPr>
-              <a:t> 02_speed_dating.ipynb</a:t>
+              <a:t>matches</a:t>
+            </a:r>
+          </a:p>
+          <a:p>
+            <a:r>
+              <a:rPr lang="en-US" dirty="0"/>
+              <a:t>They are trying to find a way to understand what makes people interested into each other.</a:t>
+            </a:r>
+          </a:p>
+          <a:p>
+            <a:r>
+              <a:rPr lang="en-US" dirty="0"/>
+              <a:t>Use the dataset to understand what makes people interested into each other to go on </a:t>
+            </a:r>
+            <a:r>
+              <a:rPr lang="en-US" dirty="0">
+                <a:highlight>
+                  <a:srgbClr val="FFFF00"/>
+                </a:highlight>
+              </a:rPr>
+              <a:t>a second date </a:t>
+            </a:r>
+            <a:r>
+              <a:rPr lang="en-US" dirty="0"/>
+              <a:t>together</a:t>
             </a:r>
           </a:p>
         </p:txBody>
@@ -16122,7 +16342,7 @@
     </p:spTree>
     <p:extLst>
       <p:ext uri="{BB962C8B-B14F-4D97-AF65-F5344CB8AC3E}">
-        <p14:creationId xmlns:p14="http://schemas.microsoft.com/office/powerpoint/2010/main" val="3595025937"/>
+        <p14:creationId xmlns:p14="http://schemas.microsoft.com/office/powerpoint/2010/main" val="246086491"/>
       </p:ext>
     </p:extLst>
   </p:cSld>
@@ -16737,7 +16957,7 @@
           <p:cNvPr id="2" name="Titre 1">
             <a:extLst>
               <a:ext uri="{FF2B5EF4-FFF2-40B4-BE49-F238E27FC236}">
-                <a16:creationId xmlns:a16="http://schemas.microsoft.com/office/drawing/2014/main" id="{0973683F-97F4-B09A-A1A0-F35F30E7220F}"/>
+                <a16:creationId xmlns:a16="http://schemas.microsoft.com/office/drawing/2014/main" id="{9401C507-3D1F-23F1-FC25-F88A14E5D2D2}"/>
               </a:ext>
             </a:extLst>
           </p:cNvPr>
@@ -16755,90 +16975,700 @@
           <a:p>
             <a:r>
               <a:rPr lang="fr-FR" dirty="0" err="1"/>
-              <a:t>Specifications</a:t>
+              <a:t>Executive</a:t>
+            </a:r>
+            <a:r>
+              <a:rPr lang="fr-FR" dirty="0"/>
+              <a:t> </a:t>
+            </a:r>
+            <a:r>
+              <a:rPr lang="fr-FR" dirty="0" err="1"/>
+              <a:t>Summary</a:t>
             </a:r>
             <a:endParaRPr lang="fr-FR" dirty="0"/>
+          </a:p>
+        </p:txBody>
+      </p:sp>
+      <p:pic>
+        <p:nvPicPr>
+          <p:cNvPr id="5" name="Image 4">
+            <a:extLst>
+              <a:ext uri="{FF2B5EF4-FFF2-40B4-BE49-F238E27FC236}">
+                <a16:creationId xmlns:a16="http://schemas.microsoft.com/office/drawing/2014/main" id="{2B92A725-ABA1-9076-A45D-26AB83219752}"/>
+              </a:ext>
+            </a:extLst>
+          </p:cNvPr>
+          <p:cNvPicPr>
+            <a:picLocks noChangeAspect="1"/>
+          </p:cNvPicPr>
+          <p:nvPr/>
+        </p:nvPicPr>
+        <p:blipFill>
+          <a:blip r:embed="rId3"/>
+          <a:stretch>
+            <a:fillRect/>
+          </a:stretch>
+        </p:blipFill>
+        <p:spPr>
+          <a:xfrm rot="21387705">
+            <a:off x="367277" y="863593"/>
+            <a:ext cx="11283991" cy="4844284"/>
+          </a:xfrm>
+          <a:prstGeom prst="rect">
+            <a:avLst/>
+          </a:prstGeom>
+          <a:effectLst>
+            <a:outerShdw blurRad="50800" dist="38100" dir="2700000" algn="tl" rotWithShape="0">
+              <a:prstClr val="black">
+                <a:alpha val="40000"/>
+              </a:prstClr>
+            </a:outerShdw>
+          </a:effectLst>
+        </p:spPr>
+      </p:pic>
+      <p:sp>
+        <p:nvSpPr>
+          <p:cNvPr id="3" name="ZoneTexte 2">
+            <a:extLst>
+              <a:ext uri="{FF2B5EF4-FFF2-40B4-BE49-F238E27FC236}">
+                <a16:creationId xmlns:a16="http://schemas.microsoft.com/office/drawing/2014/main" id="{DAA69606-7991-E7A7-6DA7-C10E2197153D}"/>
+              </a:ext>
+            </a:extLst>
+          </p:cNvPr>
+          <p:cNvSpPr txBox="1"/>
+          <p:nvPr/>
+        </p:nvSpPr>
+        <p:spPr>
+          <a:xfrm rot="21345198">
+            <a:off x="9618495" y="5403420"/>
+            <a:ext cx="2151551" cy="307777"/>
+          </a:xfrm>
+          <a:prstGeom prst="rect">
+            <a:avLst/>
+          </a:prstGeom>
+          <a:noFill/>
+        </p:spPr>
+        <p:txBody>
+          <a:bodyPr wrap="none" rtlCol="0">
+            <a:spAutoFit/>
+          </a:bodyPr>
+          <a:lstStyle/>
+          <a:p>
+            <a:r>
+              <a:rPr lang="fr-FR" sz="1400" i="1" dirty="0" err="1">
+                <a:latin typeface="Times New Roman" panose="02020603050405020304" pitchFamily="18" charset="0"/>
+                <a:cs typeface="Times New Roman" panose="02020603050405020304" pitchFamily="18" charset="0"/>
+              </a:rPr>
+              <a:t>See</a:t>
+            </a:r>
+            <a:r>
+              <a:rPr lang="fr-FR" sz="1400" i="1" dirty="0">
+                <a:latin typeface="Times New Roman" panose="02020603050405020304" pitchFamily="18" charset="0"/>
+                <a:cs typeface="Times New Roman" panose="02020603050405020304" pitchFamily="18" charset="0"/>
+              </a:rPr>
+              <a:t> 02_speed_dating.ipynb</a:t>
+            </a:r>
           </a:p>
         </p:txBody>
       </p:sp>
       <p:sp>
         <p:nvSpPr>
-          <p:cNvPr id="3" name="Espace réservé du contenu 2">
+          <p:cNvPr id="4" name="Rectangle 3">
             <a:extLst>
               <a:ext uri="{FF2B5EF4-FFF2-40B4-BE49-F238E27FC236}">
-                <a16:creationId xmlns:a16="http://schemas.microsoft.com/office/drawing/2014/main" id="{A88399CA-BBD6-ECCC-534E-0335C54116C3}"/>
+                <a16:creationId xmlns:a16="http://schemas.microsoft.com/office/drawing/2014/main" id="{57D6FBB8-8A7C-DFEE-E53A-54F61A96336C}"/>
               </a:ext>
             </a:extLst>
           </p:cNvPr>
-          <p:cNvSpPr>
-            <a:spLocks noGrp="1"/>
-          </p:cNvSpPr>
-          <p:nvPr>
-            <p:ph idx="1"/>
-          </p:nvPr>
+          <p:cNvSpPr/>
+          <p:nvPr/>
         </p:nvSpPr>
-        <p:spPr/>
+        <p:spPr>
+          <a:xfrm rot="21386964">
+            <a:off x="2505134" y="1749660"/>
+            <a:ext cx="1493751" cy="212432"/>
+          </a:xfrm>
+          <a:prstGeom prst="rect">
+            <a:avLst/>
+          </a:prstGeom>
+          <a:solidFill>
+            <a:srgbClr val="FF0000">
+              <a:alpha val="50000"/>
+            </a:srgbClr>
+          </a:solidFill>
+          <a:ln>
+            <a:noFill/>
+          </a:ln>
+        </p:spPr>
+        <p:style>
+          <a:lnRef idx="2">
+            <a:schemeClr val="accent1">
+              <a:shade val="15000"/>
+            </a:schemeClr>
+          </a:lnRef>
+          <a:fillRef idx="1">
+            <a:schemeClr val="accent1"/>
+          </a:fillRef>
+          <a:effectRef idx="0">
+            <a:schemeClr val="accent1"/>
+          </a:effectRef>
+          <a:fontRef idx="minor">
+            <a:schemeClr val="lt1"/>
+          </a:fontRef>
+        </p:style>
         <p:txBody>
-          <a:bodyPr>
-            <a:normAutofit/>
-          </a:bodyPr>
+          <a:bodyPr rtlCol="0" anchor="ctr"/>
           <a:lstStyle/>
           <a:p>
-            <a:r>
-              <a:rPr lang="en-US" dirty="0"/>
-              <a:t>Tinder is experiencing a </a:t>
-            </a:r>
-            <a:r>
-              <a:rPr lang="en-US" dirty="0">
-                <a:highlight>
-                  <a:srgbClr val="FFFF00"/>
-                </a:highlight>
-              </a:rPr>
-              <a:t>decrease</a:t>
-            </a:r>
-            <a:r>
-              <a:rPr lang="en-US" dirty="0"/>
-              <a:t> in the number of </a:t>
-            </a:r>
-            <a:r>
-              <a:rPr lang="en-US" dirty="0">
-                <a:highlight>
-                  <a:srgbClr val="FFFF00"/>
-                </a:highlight>
-              </a:rPr>
-              <a:t>matches</a:t>
-            </a:r>
-          </a:p>
-          <a:p>
-            <a:r>
-              <a:rPr lang="en-US" dirty="0"/>
-              <a:t>They are trying to find a way to understand what makes people interested into each other.</a:t>
-            </a:r>
-          </a:p>
-          <a:p>
-            <a:r>
-              <a:rPr lang="en-US" dirty="0"/>
-              <a:t>Use the dataset to understand what makes people interested into each other to go on </a:t>
-            </a:r>
-            <a:r>
-              <a:rPr lang="en-US" dirty="0">
-                <a:highlight>
-                  <a:srgbClr val="FFFF00"/>
-                </a:highlight>
-              </a:rPr>
-              <a:t>a second date </a:t>
-            </a:r>
-            <a:r>
-              <a:rPr lang="en-US" dirty="0"/>
-              <a:t>together</a:t>
-            </a:r>
+            <a:pPr algn="ctr"/>
+            <a:endParaRPr lang="fr-FR"/>
+          </a:p>
+        </p:txBody>
+      </p:sp>
+      <p:sp>
+        <p:nvSpPr>
+          <p:cNvPr id="6" name="Rectangle 5">
+            <a:extLst>
+              <a:ext uri="{FF2B5EF4-FFF2-40B4-BE49-F238E27FC236}">
+                <a16:creationId xmlns:a16="http://schemas.microsoft.com/office/drawing/2014/main" id="{6DFE76AE-2F65-78EB-1B24-8A0ABB505C30}"/>
+              </a:ext>
+            </a:extLst>
+          </p:cNvPr>
+          <p:cNvSpPr/>
+          <p:nvPr/>
+        </p:nvSpPr>
+        <p:spPr>
+          <a:xfrm rot="21386964">
+            <a:off x="1238287" y="2090330"/>
+            <a:ext cx="326682" cy="212432"/>
+          </a:xfrm>
+          <a:prstGeom prst="rect">
+            <a:avLst/>
+          </a:prstGeom>
+          <a:solidFill>
+            <a:srgbClr val="FF0000">
+              <a:alpha val="50000"/>
+            </a:srgbClr>
+          </a:solidFill>
+          <a:ln>
+            <a:noFill/>
+          </a:ln>
+        </p:spPr>
+        <p:style>
+          <a:lnRef idx="2">
+            <a:schemeClr val="accent1">
+              <a:shade val="15000"/>
+            </a:schemeClr>
+          </a:lnRef>
+          <a:fillRef idx="1">
+            <a:schemeClr val="accent1"/>
+          </a:fillRef>
+          <a:effectRef idx="0">
+            <a:schemeClr val="accent1"/>
+          </a:effectRef>
+          <a:fontRef idx="minor">
+            <a:schemeClr val="lt1"/>
+          </a:fontRef>
+        </p:style>
+        <p:txBody>
+          <a:bodyPr rtlCol="0" anchor="ctr"/>
+          <a:lstStyle/>
+          <a:p>
+            <a:pPr algn="ctr"/>
+            <a:endParaRPr lang="fr-FR"/>
+          </a:p>
+        </p:txBody>
+      </p:sp>
+      <p:sp>
+        <p:nvSpPr>
+          <p:cNvPr id="7" name="Rectangle 6">
+            <a:extLst>
+              <a:ext uri="{FF2B5EF4-FFF2-40B4-BE49-F238E27FC236}">
+                <a16:creationId xmlns:a16="http://schemas.microsoft.com/office/drawing/2014/main" id="{9448BFE7-B5D1-0F2D-3650-2EFB37548E4D}"/>
+              </a:ext>
+            </a:extLst>
+          </p:cNvPr>
+          <p:cNvSpPr/>
+          <p:nvPr/>
+        </p:nvSpPr>
+        <p:spPr>
+          <a:xfrm rot="21386964">
+            <a:off x="4589504" y="2039300"/>
+            <a:ext cx="1974728" cy="212432"/>
+          </a:xfrm>
+          <a:prstGeom prst="rect">
+            <a:avLst/>
+          </a:prstGeom>
+          <a:solidFill>
+            <a:srgbClr val="FF0000">
+              <a:alpha val="50000"/>
+            </a:srgbClr>
+          </a:solidFill>
+          <a:ln>
+            <a:noFill/>
+          </a:ln>
+        </p:spPr>
+        <p:style>
+          <a:lnRef idx="2">
+            <a:schemeClr val="accent1">
+              <a:shade val="15000"/>
+            </a:schemeClr>
+          </a:lnRef>
+          <a:fillRef idx="1">
+            <a:schemeClr val="accent1"/>
+          </a:fillRef>
+          <a:effectRef idx="0">
+            <a:schemeClr val="accent1"/>
+          </a:effectRef>
+          <a:fontRef idx="minor">
+            <a:schemeClr val="lt1"/>
+          </a:fontRef>
+        </p:style>
+        <p:txBody>
+          <a:bodyPr rtlCol="0" anchor="ctr"/>
+          <a:lstStyle/>
+          <a:p>
+            <a:pPr algn="ctr"/>
+            <a:endParaRPr lang="fr-FR"/>
+          </a:p>
+        </p:txBody>
+      </p:sp>
+      <p:sp>
+        <p:nvSpPr>
+          <p:cNvPr id="8" name="Rectangle 7">
+            <a:extLst>
+              <a:ext uri="{FF2B5EF4-FFF2-40B4-BE49-F238E27FC236}">
+                <a16:creationId xmlns:a16="http://schemas.microsoft.com/office/drawing/2014/main" id="{552367B6-4E07-2E5B-998A-6EA418CA9C98}"/>
+              </a:ext>
+            </a:extLst>
+          </p:cNvPr>
+          <p:cNvSpPr/>
+          <p:nvPr/>
+        </p:nvSpPr>
+        <p:spPr>
+          <a:xfrm rot="21386964">
+            <a:off x="719288" y="2494169"/>
+            <a:ext cx="1199232" cy="212432"/>
+          </a:xfrm>
+          <a:prstGeom prst="rect">
+            <a:avLst/>
+          </a:prstGeom>
+          <a:solidFill>
+            <a:srgbClr val="FF0000">
+              <a:alpha val="50000"/>
+            </a:srgbClr>
+          </a:solidFill>
+          <a:ln>
+            <a:noFill/>
+          </a:ln>
+        </p:spPr>
+        <p:style>
+          <a:lnRef idx="2">
+            <a:schemeClr val="accent1">
+              <a:shade val="15000"/>
+            </a:schemeClr>
+          </a:lnRef>
+          <a:fillRef idx="1">
+            <a:schemeClr val="accent1"/>
+          </a:fillRef>
+          <a:effectRef idx="0">
+            <a:schemeClr val="accent1"/>
+          </a:effectRef>
+          <a:fontRef idx="minor">
+            <a:schemeClr val="lt1"/>
+          </a:fontRef>
+        </p:style>
+        <p:txBody>
+          <a:bodyPr rtlCol="0" anchor="ctr"/>
+          <a:lstStyle/>
+          <a:p>
+            <a:pPr algn="ctr"/>
+            <a:endParaRPr lang="fr-FR"/>
+          </a:p>
+        </p:txBody>
+      </p:sp>
+      <p:sp>
+        <p:nvSpPr>
+          <p:cNvPr id="9" name="Rectangle 8">
+            <a:extLst>
+              <a:ext uri="{FF2B5EF4-FFF2-40B4-BE49-F238E27FC236}">
+                <a16:creationId xmlns:a16="http://schemas.microsoft.com/office/drawing/2014/main" id="{B6223E86-142F-1586-FB8D-1DA87531DD52}"/>
+              </a:ext>
+            </a:extLst>
+          </p:cNvPr>
+          <p:cNvSpPr/>
+          <p:nvPr/>
+        </p:nvSpPr>
+        <p:spPr>
+          <a:xfrm rot="21386964">
+            <a:off x="2121763" y="2626378"/>
+            <a:ext cx="787684" cy="212432"/>
+          </a:xfrm>
+          <a:prstGeom prst="rect">
+            <a:avLst/>
+          </a:prstGeom>
+          <a:solidFill>
+            <a:srgbClr val="FF0000">
+              <a:alpha val="50000"/>
+            </a:srgbClr>
+          </a:solidFill>
+          <a:ln>
+            <a:noFill/>
+          </a:ln>
+        </p:spPr>
+        <p:style>
+          <a:lnRef idx="2">
+            <a:schemeClr val="accent1">
+              <a:shade val="15000"/>
+            </a:schemeClr>
+          </a:lnRef>
+          <a:fillRef idx="1">
+            <a:schemeClr val="accent1"/>
+          </a:fillRef>
+          <a:effectRef idx="0">
+            <a:schemeClr val="accent1"/>
+          </a:effectRef>
+          <a:fontRef idx="minor">
+            <a:schemeClr val="lt1"/>
+          </a:fontRef>
+        </p:style>
+        <p:txBody>
+          <a:bodyPr rtlCol="0" anchor="ctr"/>
+          <a:lstStyle/>
+          <a:p>
+            <a:pPr algn="ctr"/>
+            <a:endParaRPr lang="fr-FR"/>
+          </a:p>
+        </p:txBody>
+      </p:sp>
+      <p:sp>
+        <p:nvSpPr>
+          <p:cNvPr id="10" name="Rectangle 9">
+            <a:extLst>
+              <a:ext uri="{FF2B5EF4-FFF2-40B4-BE49-F238E27FC236}">
+                <a16:creationId xmlns:a16="http://schemas.microsoft.com/office/drawing/2014/main" id="{E07C8C13-6226-6B74-B92C-51947593BD15}"/>
+              </a:ext>
+            </a:extLst>
+          </p:cNvPr>
+          <p:cNvSpPr/>
+          <p:nvPr/>
+        </p:nvSpPr>
+        <p:spPr>
+          <a:xfrm rot="21386964">
+            <a:off x="4782215" y="3344187"/>
+            <a:ext cx="1982434" cy="212432"/>
+          </a:xfrm>
+          <a:prstGeom prst="rect">
+            <a:avLst/>
+          </a:prstGeom>
+          <a:solidFill>
+            <a:srgbClr val="FF0000">
+              <a:alpha val="50000"/>
+            </a:srgbClr>
+          </a:solidFill>
+          <a:ln>
+            <a:noFill/>
+          </a:ln>
+        </p:spPr>
+        <p:style>
+          <a:lnRef idx="2">
+            <a:schemeClr val="accent1">
+              <a:shade val="15000"/>
+            </a:schemeClr>
+          </a:lnRef>
+          <a:fillRef idx="1">
+            <a:schemeClr val="accent1"/>
+          </a:fillRef>
+          <a:effectRef idx="0">
+            <a:schemeClr val="accent1"/>
+          </a:effectRef>
+          <a:fontRef idx="minor">
+            <a:schemeClr val="lt1"/>
+          </a:fontRef>
+        </p:style>
+        <p:txBody>
+          <a:bodyPr rtlCol="0" anchor="ctr"/>
+          <a:lstStyle/>
+          <a:p>
+            <a:pPr algn="ctr"/>
+            <a:endParaRPr lang="fr-FR"/>
+          </a:p>
+        </p:txBody>
+      </p:sp>
+      <p:sp>
+        <p:nvSpPr>
+          <p:cNvPr id="11" name="Rectangle 10">
+            <a:extLst>
+              <a:ext uri="{FF2B5EF4-FFF2-40B4-BE49-F238E27FC236}">
+                <a16:creationId xmlns:a16="http://schemas.microsoft.com/office/drawing/2014/main" id="{F714B8FD-3E46-34C9-CC4D-0E5F461AF571}"/>
+              </a:ext>
+            </a:extLst>
+          </p:cNvPr>
+          <p:cNvSpPr/>
+          <p:nvPr/>
+        </p:nvSpPr>
+        <p:spPr>
+          <a:xfrm rot="21386964">
+            <a:off x="5234571" y="5491497"/>
+            <a:ext cx="677573" cy="212432"/>
+          </a:xfrm>
+          <a:prstGeom prst="rect">
+            <a:avLst/>
+          </a:prstGeom>
+          <a:solidFill>
+            <a:srgbClr val="FF0000">
+              <a:alpha val="50000"/>
+            </a:srgbClr>
+          </a:solidFill>
+          <a:ln>
+            <a:noFill/>
+          </a:ln>
+        </p:spPr>
+        <p:style>
+          <a:lnRef idx="2">
+            <a:schemeClr val="accent1">
+              <a:shade val="15000"/>
+            </a:schemeClr>
+          </a:lnRef>
+          <a:fillRef idx="1">
+            <a:schemeClr val="accent1"/>
+          </a:fillRef>
+          <a:effectRef idx="0">
+            <a:schemeClr val="accent1"/>
+          </a:effectRef>
+          <a:fontRef idx="minor">
+            <a:schemeClr val="lt1"/>
+          </a:fontRef>
+        </p:style>
+        <p:txBody>
+          <a:bodyPr rtlCol="0" anchor="ctr"/>
+          <a:lstStyle/>
+          <a:p>
+            <a:pPr algn="ctr"/>
+            <a:endParaRPr lang="fr-FR"/>
+          </a:p>
+        </p:txBody>
+      </p:sp>
+      <p:sp>
+        <p:nvSpPr>
+          <p:cNvPr id="12" name="Rectangle 11">
+            <a:extLst>
+              <a:ext uri="{FF2B5EF4-FFF2-40B4-BE49-F238E27FC236}">
+                <a16:creationId xmlns:a16="http://schemas.microsoft.com/office/drawing/2014/main" id="{6D71338D-331C-5A8D-0BE2-18B158E54732}"/>
+              </a:ext>
+            </a:extLst>
+          </p:cNvPr>
+          <p:cNvSpPr/>
+          <p:nvPr/>
+        </p:nvSpPr>
+        <p:spPr>
+          <a:xfrm rot="21386964">
+            <a:off x="1479434" y="4002156"/>
+            <a:ext cx="677573" cy="212432"/>
+          </a:xfrm>
+          <a:prstGeom prst="rect">
+            <a:avLst/>
+          </a:prstGeom>
+          <a:solidFill>
+            <a:srgbClr val="FF0000">
+              <a:alpha val="50000"/>
+            </a:srgbClr>
+          </a:solidFill>
+          <a:ln>
+            <a:noFill/>
+          </a:ln>
+        </p:spPr>
+        <p:style>
+          <a:lnRef idx="2">
+            <a:schemeClr val="accent1">
+              <a:shade val="15000"/>
+            </a:schemeClr>
+          </a:lnRef>
+          <a:fillRef idx="1">
+            <a:schemeClr val="accent1"/>
+          </a:fillRef>
+          <a:effectRef idx="0">
+            <a:schemeClr val="accent1"/>
+          </a:effectRef>
+          <a:fontRef idx="minor">
+            <a:schemeClr val="lt1"/>
+          </a:fontRef>
+        </p:style>
+        <p:txBody>
+          <a:bodyPr rtlCol="0" anchor="ctr"/>
+          <a:lstStyle/>
+          <a:p>
+            <a:pPr algn="ctr"/>
+            <a:endParaRPr lang="fr-FR"/>
+          </a:p>
+        </p:txBody>
+      </p:sp>
+      <p:sp>
+        <p:nvSpPr>
+          <p:cNvPr id="13" name="Rectangle 12">
+            <a:extLst>
+              <a:ext uri="{FF2B5EF4-FFF2-40B4-BE49-F238E27FC236}">
+                <a16:creationId xmlns:a16="http://schemas.microsoft.com/office/drawing/2014/main" id="{C1A165F1-2083-18A9-30CB-6F447D695915}"/>
+              </a:ext>
+            </a:extLst>
+          </p:cNvPr>
+          <p:cNvSpPr/>
+          <p:nvPr/>
+        </p:nvSpPr>
+        <p:spPr>
+          <a:xfrm rot="21386964">
+            <a:off x="2176818" y="5066462"/>
+            <a:ext cx="677573" cy="212432"/>
+          </a:xfrm>
+          <a:prstGeom prst="rect">
+            <a:avLst/>
+          </a:prstGeom>
+          <a:solidFill>
+            <a:srgbClr val="FF0000">
+              <a:alpha val="50000"/>
+            </a:srgbClr>
+          </a:solidFill>
+          <a:ln>
+            <a:noFill/>
+          </a:ln>
+        </p:spPr>
+        <p:style>
+          <a:lnRef idx="2">
+            <a:schemeClr val="accent1">
+              <a:shade val="15000"/>
+            </a:schemeClr>
+          </a:lnRef>
+          <a:fillRef idx="1">
+            <a:schemeClr val="accent1"/>
+          </a:fillRef>
+          <a:effectRef idx="0">
+            <a:schemeClr val="accent1"/>
+          </a:effectRef>
+          <a:fontRef idx="minor">
+            <a:schemeClr val="lt1"/>
+          </a:fontRef>
+        </p:style>
+        <p:txBody>
+          <a:bodyPr rtlCol="0" anchor="ctr"/>
+          <a:lstStyle/>
+          <a:p>
+            <a:pPr algn="ctr"/>
+            <a:endParaRPr lang="fr-FR"/>
+          </a:p>
+        </p:txBody>
+      </p:sp>
+      <p:sp>
+        <p:nvSpPr>
+          <p:cNvPr id="14" name="Rectangle 13">
+            <a:extLst>
+              <a:ext uri="{FF2B5EF4-FFF2-40B4-BE49-F238E27FC236}">
+                <a16:creationId xmlns:a16="http://schemas.microsoft.com/office/drawing/2014/main" id="{2725DC78-6B38-B594-8745-33E4492EB206}"/>
+              </a:ext>
+            </a:extLst>
+          </p:cNvPr>
+          <p:cNvSpPr/>
+          <p:nvPr/>
+        </p:nvSpPr>
+        <p:spPr>
+          <a:xfrm rot="21386964">
+            <a:off x="893382" y="5546045"/>
+            <a:ext cx="524669" cy="212432"/>
+          </a:xfrm>
+          <a:prstGeom prst="rect">
+            <a:avLst/>
+          </a:prstGeom>
+          <a:solidFill>
+            <a:srgbClr val="FF0000">
+              <a:alpha val="50000"/>
+            </a:srgbClr>
+          </a:solidFill>
+          <a:ln>
+            <a:noFill/>
+          </a:ln>
+        </p:spPr>
+        <p:style>
+          <a:lnRef idx="2">
+            <a:schemeClr val="accent1">
+              <a:shade val="15000"/>
+            </a:schemeClr>
+          </a:lnRef>
+          <a:fillRef idx="1">
+            <a:schemeClr val="accent1"/>
+          </a:fillRef>
+          <a:effectRef idx="0">
+            <a:schemeClr val="accent1"/>
+          </a:effectRef>
+          <a:fontRef idx="minor">
+            <a:schemeClr val="lt1"/>
+          </a:fontRef>
+        </p:style>
+        <p:txBody>
+          <a:bodyPr rtlCol="0" anchor="ctr"/>
+          <a:lstStyle/>
+          <a:p>
+            <a:pPr algn="ctr"/>
+            <a:endParaRPr lang="fr-FR"/>
+          </a:p>
+        </p:txBody>
+      </p:sp>
+      <p:sp>
+        <p:nvSpPr>
+          <p:cNvPr id="15" name="Rectangle 14">
+            <a:extLst>
+              <a:ext uri="{FF2B5EF4-FFF2-40B4-BE49-F238E27FC236}">
+                <a16:creationId xmlns:a16="http://schemas.microsoft.com/office/drawing/2014/main" id="{733BEA0B-A749-0B52-5567-71CED592B878}"/>
+              </a:ext>
+            </a:extLst>
+          </p:cNvPr>
+          <p:cNvSpPr/>
+          <p:nvPr/>
+        </p:nvSpPr>
+        <p:spPr>
+          <a:xfrm rot="21386964">
+            <a:off x="740336" y="3422450"/>
+            <a:ext cx="979628" cy="212432"/>
+          </a:xfrm>
+          <a:prstGeom prst="rect">
+            <a:avLst/>
+          </a:prstGeom>
+          <a:solidFill>
+            <a:srgbClr val="FF0000">
+              <a:alpha val="50000"/>
+            </a:srgbClr>
+          </a:solidFill>
+          <a:ln>
+            <a:noFill/>
+          </a:ln>
+        </p:spPr>
+        <p:style>
+          <a:lnRef idx="2">
+            <a:schemeClr val="accent1">
+              <a:shade val="15000"/>
+            </a:schemeClr>
+          </a:lnRef>
+          <a:fillRef idx="1">
+            <a:schemeClr val="accent1"/>
+          </a:fillRef>
+          <a:effectRef idx="0">
+            <a:schemeClr val="accent1"/>
+          </a:effectRef>
+          <a:fontRef idx="minor">
+            <a:schemeClr val="lt1"/>
+          </a:fontRef>
+        </p:style>
+        <p:txBody>
+          <a:bodyPr rtlCol="0" anchor="ctr"/>
+          <a:lstStyle/>
+          <a:p>
+            <a:pPr algn="ctr"/>
+            <a:endParaRPr lang="fr-FR"/>
           </a:p>
         </p:txBody>
       </p:sp>
     </p:spTree>
     <p:extLst>
       <p:ext uri="{BB962C8B-B14F-4D97-AF65-F5344CB8AC3E}">
-        <p14:creationId xmlns:p14="http://schemas.microsoft.com/office/powerpoint/2010/main" val="246086491"/>
+        <p14:creationId xmlns:p14="http://schemas.microsoft.com/office/powerpoint/2010/main" val="3595025937"/>
       </p:ext>
     </p:extLst>
   </p:cSld>
@@ -16849,7 +17679,7 @@
 </file>
 
 <file path=ppt/slides/slide4.xml><?xml version="1.0" encoding="utf-8"?>
-<p:sld xmlns:a="http://schemas.openxmlformats.org/drawingml/2006/main" xmlns:r="http://schemas.openxmlformats.org/officeDocument/2006/relationships" xmlns:p="http://schemas.openxmlformats.org/presentationml/2006/main">
+<p:sld xmlns:a="http://schemas.openxmlformats.org/drawingml/2006/main" xmlns:r="http://schemas.openxmlformats.org/officeDocument/2006/relationships" xmlns:p="http://schemas.openxmlformats.org/presentationml/2006/main" show="0">
   <p:cSld>
     <p:spTree>
       <p:nvGrpSpPr>
@@ -17064,7 +17894,7 @@
 </file>
 
 <file path=ppt/slides/slide5.xml><?xml version="1.0" encoding="utf-8"?>
-<p:sld xmlns:a="http://schemas.openxmlformats.org/drawingml/2006/main" xmlns:r="http://schemas.openxmlformats.org/officeDocument/2006/relationships" xmlns:p="http://schemas.openxmlformats.org/presentationml/2006/main">
+<p:sld xmlns:a="http://schemas.openxmlformats.org/drawingml/2006/main" xmlns:r="http://schemas.openxmlformats.org/officeDocument/2006/relationships" xmlns:p="http://schemas.openxmlformats.org/presentationml/2006/main" show="0">
   <p:cSld>
     <p:spTree>
       <p:nvGrpSpPr>
@@ -18226,7 +19056,7 @@
 </file>
 
 <file path=ppt/slides/slide7.xml><?xml version="1.0" encoding="utf-8"?>
-<p:sld xmlns:a="http://schemas.openxmlformats.org/drawingml/2006/main" xmlns:r="http://schemas.openxmlformats.org/officeDocument/2006/relationships" xmlns:p="http://schemas.openxmlformats.org/presentationml/2006/main">
+<p:sld xmlns:a="http://schemas.openxmlformats.org/drawingml/2006/main" xmlns:r="http://schemas.openxmlformats.org/officeDocument/2006/relationships" xmlns:p="http://schemas.openxmlformats.org/presentationml/2006/main" show="0">
   <p:cSld>
     <p:spTree>
       <p:nvGrpSpPr>

</xml_diff>